<commit_message>
update css-os_sims-2.pptx and add tmp0917
</commit_message>
<xml_diff>
--- a/PPT/20181107/css-os_sims-2.pptx
+++ b/PPT/20181107/css-os_sims-2.pptx
@@ -1,6 +1,6 @@
 
 <file path=ppt/presentation.xml><?xml version="1.0" encoding="utf-8"?>
-<p:presentation xmlns:a="http://schemas.openxmlformats.org/drawingml/2006/main" xmlns:r="http://schemas.openxmlformats.org/officeDocument/2006/relationships" xmlns:p="http://schemas.openxmlformats.org/presentationml/2006/main" bookmarkIdSeed="4" showSpecialPlsOnTitleSld="0">
+<p:presentation xmlns:a="http://schemas.openxmlformats.org/drawingml/2006/main" xmlns:r="http://schemas.openxmlformats.org/officeDocument/2006/relationships" xmlns:p="http://schemas.openxmlformats.org/presentationml/2006/main" showSpecialPlsOnTitleSld="0" bookmarkIdSeed="4">
   <p:sldMasterIdLst>
     <p:sldMasterId id="2147483648" r:id="rId1"/>
   </p:sldMasterIdLst>
@@ -11,15 +11,16 @@
     <p:handoutMasterId r:id="rId10"/>
   </p:handoutMasterIdLst>
   <p:sldIdLst>
-    <p:sldId id="1316" r:id="rId3"/>
-    <p:sldId id="1309" r:id="rId4"/>
-    <p:sldId id="1286" r:id="rId5"/>
+    <p:sldId id="1316" r:id="rId2"/>
+    <p:sldId id="1309" r:id="rId3"/>
+    <p:sldId id="1286" r:id="rId4"/>
+    <p:sldId id="1317" r:id="rId5"/>
     <p:sldId id="1313" r:id="rId6"/>
     <p:sldId id="1312" r:id="rId7"/>
     <p:sldId id="1307" r:id="rId8"/>
   </p:sldIdLst>
   <p:sldSz cx="9144000" cy="6858000" type="screen4x3"/>
-  <p:notesSz cx="6668770" cy="9928225"/>
+  <p:notesSz cx="6669088" cy="9928225"/>
   <p:defaultTextStyle>
     <a:defPPr>
       <a:defRPr lang="zh-CN"/>
@@ -145,6 +146,25 @@
       </a:defRPr>
     </a:lvl9pPr>
   </p:defaultTextStyle>
+  <p:extLst>
+    <p:ext uri="{EFAFB233-063F-42B5-8137-9DF3F51BA10A}">
+      <p15:sldGuideLst xmlns:p15="http://schemas.microsoft.com/office/powerpoint/2012/main">
+        <p15:guide id="1" orient="horz" pos="2095">
+          <p15:clr>
+            <a:srgbClr val="A4A3A4"/>
+          </p15:clr>
+        </p15:guide>
+        <p15:guide id="2" pos="2880">
+          <p15:clr>
+            <a:srgbClr val="A4A3A4"/>
+          </p15:clr>
+        </p15:guide>
+      </p15:sldGuideLst>
+    </p:ext>
+    <p:ext uri="{2D200454-40CA-4A62-9FC3-DE9A4176ACB9}">
+      <p15:notesGuideLst xmlns:p15="http://schemas.microsoft.com/office/powerpoint/2012/main"/>
+    </p:ext>
+  </p:extLst>
 </p:presentation>
 </file>
 
@@ -255,6 +275,7 @@
             </a:pPr>
             <a:fld id="{408F4921-C51D-49A8-8D26-C9A36C1920DC}" type="datetimeFigureOut">
               <a:rPr lang="zh-CN" altLang="en-US"/>
+              <a:t>2018/11/8</a:t>
             </a:fld>
             <a:endParaRPr lang="zh-CN" altLang="en-US"/>
           </a:p>
@@ -338,6 +359,7 @@
             </a:pPr>
             <a:fld id="{E980E8FA-6FC2-4B27-B159-8B6723D717A4}" type="slidenum">
               <a:rPr lang="zh-CN" altLang="en-US"/>
+              <a:t>‹#›</a:t>
             </a:fld>
             <a:endParaRPr lang="zh-CN" altLang="en-US"/>
           </a:p>
@@ -449,6 +471,7 @@
             </a:pPr>
             <a:fld id="{8396302A-CFAA-4BE5-83F9-E44C7129ED9A}" type="datetimeFigureOut">
               <a:rPr lang="zh-CN" altLang="en-US"/>
+              <a:t>2018/11/8</a:t>
             </a:fld>
             <a:endParaRPr lang="zh-CN" altLang="en-US"/>
           </a:p>
@@ -518,7 +541,6 @@
               <a:rPr lang="zh-CN" altLang="en-US" noProof="0"/>
               <a:t>单击此处编辑母版文本样式</a:t>
             </a:r>
-            <a:endParaRPr lang="zh-CN" altLang="en-US" noProof="0"/>
           </a:p>
           <a:p>
             <a:pPr lvl="1"/>
@@ -526,7 +548,6 @@
               <a:rPr lang="zh-CN" altLang="en-US" noProof="0"/>
               <a:t>第二级</a:t>
             </a:r>
-            <a:endParaRPr lang="zh-CN" altLang="en-US" noProof="0"/>
           </a:p>
           <a:p>
             <a:pPr lvl="2"/>
@@ -534,7 +555,6 @@
               <a:rPr lang="zh-CN" altLang="en-US" noProof="0"/>
               <a:t>第三级</a:t>
             </a:r>
-            <a:endParaRPr lang="zh-CN" altLang="en-US" noProof="0"/>
           </a:p>
           <a:p>
             <a:pPr lvl="3"/>
@@ -542,7 +562,6 @@
               <a:rPr lang="zh-CN" altLang="en-US" noProof="0"/>
               <a:t>第四级</a:t>
             </a:r>
-            <a:endParaRPr lang="zh-CN" altLang="en-US" noProof="0"/>
           </a:p>
           <a:p>
             <a:pPr lvl="4"/>
@@ -550,7 +569,6 @@
               <a:rPr lang="zh-CN" altLang="en-US" noProof="0"/>
               <a:t>第五级</a:t>
             </a:r>
-            <a:endParaRPr lang="zh-CN" altLang="en-US" noProof="0"/>
           </a:p>
         </p:txBody>
       </p:sp>
@@ -632,6 +650,7 @@
             </a:pPr>
             <a:fld id="{D9EFE58E-1B5A-4A7E-8E03-1DB3B247A06E}" type="slidenum">
               <a:rPr lang="zh-CN" altLang="en-US"/>
+              <a:t>‹#›</a:t>
             </a:fld>
             <a:endParaRPr lang="zh-CN" altLang="en-US"/>
           </a:p>
@@ -965,6 +984,7 @@
             </a:pPr>
             <a:fld id="{648D5A40-685B-4851-9148-19471223B4DB}" type="datetime1">
               <a:rPr lang="zh-CN" altLang="en-US" smtClean="0"/>
+              <a:t>2018/11/8</a:t>
             </a:fld>
             <a:endParaRPr lang="en-US" altLang="zh-CN"/>
           </a:p>
@@ -1012,12 +1032,12 @@
             </a:pPr>
             <a:fld id="{18C0489C-0D0B-44A9-8064-E03206FCC99E}" type="slidenum">
               <a:rPr lang="en-US" altLang="zh-CN" smtClean="0"/>
+              <a:t>‹#›</a:t>
             </a:fld>
             <a:r>
               <a:rPr lang="en-US" altLang="zh-CN"/>
               <a:t>/43</a:t>
             </a:r>
-            <a:endParaRPr lang="en-US" altLang="zh-CN"/>
           </a:p>
         </p:txBody>
       </p:sp>
@@ -1133,7 +1153,6 @@
               <a:rPr lang="en-US" altLang="zh-CN" dirty="0"/>
               <a:t>Click to edit Master text styles</a:t>
             </a:r>
-            <a:endParaRPr lang="en-US" altLang="zh-CN" dirty="0"/>
           </a:p>
           <a:p>
             <a:pPr lvl="1"/>
@@ -1141,7 +1160,6 @@
               <a:rPr lang="en-US" altLang="zh-CN" dirty="0"/>
               <a:t>Second level</a:t>
             </a:r>
-            <a:endParaRPr lang="en-US" altLang="zh-CN" dirty="0"/>
           </a:p>
           <a:p>
             <a:pPr lvl="2"/>
@@ -1149,7 +1167,6 @@
               <a:rPr lang="en-US" altLang="zh-CN" dirty="0"/>
               <a:t>Third level</a:t>
             </a:r>
-            <a:endParaRPr lang="en-US" altLang="zh-CN" dirty="0"/>
           </a:p>
           <a:p>
             <a:pPr lvl="3"/>
@@ -1157,7 +1174,6 @@
               <a:rPr lang="en-US" altLang="zh-CN" dirty="0"/>
               <a:t>Fourth level</a:t>
             </a:r>
-            <a:endParaRPr lang="en-US" altLang="zh-CN" dirty="0"/>
           </a:p>
           <a:p>
             <a:pPr lvl="4"/>
@@ -1189,6 +1205,7 @@
             </a:pPr>
             <a:fld id="{7A5D666B-8269-4FB8-B13D-9E316EA82E12}" type="datetime1">
               <a:rPr lang="zh-CN" altLang="en-US" smtClean="0"/>
+              <a:t>2018/11/8</a:t>
             </a:fld>
             <a:endParaRPr lang="en-US" altLang="zh-CN"/>
           </a:p>
@@ -1236,12 +1253,12 @@
             </a:pPr>
             <a:fld id="{9FAFF1DE-EEE8-437C-A843-E0D864A24C4A}" type="slidenum">
               <a:rPr lang="en-US" altLang="zh-CN" smtClean="0"/>
+              <a:t>‹#›</a:t>
             </a:fld>
             <a:r>
               <a:rPr lang="en-US" altLang="zh-CN"/>
               <a:t>/43</a:t>
             </a:r>
-            <a:endParaRPr lang="en-US" altLang="zh-CN"/>
           </a:p>
         </p:txBody>
       </p:sp>
@@ -1323,7 +1340,6 @@
               <a:rPr lang="en-US" altLang="zh-CN"/>
               <a:t>Click to edit Master text styles</a:t>
             </a:r>
-            <a:endParaRPr lang="en-US" altLang="zh-CN"/>
           </a:p>
           <a:p>
             <a:pPr lvl="1"/>
@@ -1331,7 +1347,6 @@
               <a:rPr lang="en-US" altLang="zh-CN"/>
               <a:t>Second level</a:t>
             </a:r>
-            <a:endParaRPr lang="en-US" altLang="zh-CN"/>
           </a:p>
           <a:p>
             <a:pPr lvl="2"/>
@@ -1339,7 +1354,6 @@
               <a:rPr lang="en-US" altLang="zh-CN"/>
               <a:t>Third level</a:t>
             </a:r>
-            <a:endParaRPr lang="en-US" altLang="zh-CN"/>
           </a:p>
           <a:p>
             <a:pPr lvl="3"/>
@@ -1347,7 +1361,6 @@
               <a:rPr lang="en-US" altLang="zh-CN"/>
               <a:t>Fourth level</a:t>
             </a:r>
-            <a:endParaRPr lang="en-US" altLang="zh-CN"/>
           </a:p>
           <a:p>
             <a:pPr lvl="4"/>
@@ -1379,6 +1392,7 @@
             </a:pPr>
             <a:fld id="{DAB21C60-792D-40E2-8917-E263D06DE5D7}" type="datetime1">
               <a:rPr lang="zh-CN" altLang="en-US" smtClean="0"/>
+              <a:t>2018/11/8</a:t>
             </a:fld>
             <a:endParaRPr lang="en-US" altLang="zh-CN"/>
           </a:p>
@@ -1426,12 +1440,12 @@
             </a:pPr>
             <a:fld id="{9FAFF1DE-EEE8-437C-A843-E0D864A24C4A}" type="slidenum">
               <a:rPr lang="en-US" altLang="zh-CN" smtClean="0"/>
+              <a:t>‹#›</a:t>
             </a:fld>
             <a:r>
               <a:rPr lang="en-US" altLang="zh-CN"/>
               <a:t>/43</a:t>
             </a:r>
-            <a:endParaRPr lang="en-US" altLang="zh-CN"/>
           </a:p>
         </p:txBody>
       </p:sp>
@@ -1597,7 +1611,6 @@
               <a:rPr lang="en-US" altLang="zh-CN" dirty="0"/>
               <a:t>Click to edit Master text styles</a:t>
             </a:r>
-            <a:endParaRPr lang="en-US" altLang="zh-CN" dirty="0"/>
           </a:p>
           <a:p>
             <a:pPr lvl="1"/>
@@ -1605,7 +1618,6 @@
               <a:rPr lang="en-US" altLang="zh-CN" dirty="0"/>
               <a:t>Second level</a:t>
             </a:r>
-            <a:endParaRPr lang="en-US" altLang="zh-CN" dirty="0"/>
           </a:p>
           <a:p>
             <a:pPr lvl="2"/>
@@ -1613,7 +1625,6 @@
               <a:rPr lang="en-US" altLang="zh-CN" dirty="0"/>
               <a:t>Third level</a:t>
             </a:r>
-            <a:endParaRPr lang="en-US" altLang="zh-CN" dirty="0"/>
           </a:p>
           <a:p>
             <a:pPr lvl="3"/>
@@ -1621,7 +1632,6 @@
               <a:rPr lang="en-US" altLang="zh-CN" dirty="0"/>
               <a:t>Fourth level</a:t>
             </a:r>
-            <a:endParaRPr lang="en-US" altLang="zh-CN" dirty="0"/>
           </a:p>
           <a:p>
             <a:pPr lvl="4"/>
@@ -1653,6 +1663,7 @@
             </a:pPr>
             <a:fld id="{A1258361-5A13-497A-8B4E-8FEC281245A4}" type="datetime1">
               <a:rPr lang="zh-CN" altLang="en-US" smtClean="0"/>
+              <a:t>2018/11/8</a:t>
             </a:fld>
             <a:endParaRPr lang="en-US" altLang="zh-CN"/>
           </a:p>
@@ -1700,12 +1711,12 @@
             </a:pPr>
             <a:fld id="{9FAFF1DE-EEE8-437C-A843-E0D864A24C4A}" type="slidenum">
               <a:rPr lang="en-US" altLang="zh-CN" smtClean="0"/>
+              <a:t>‹#›</a:t>
             </a:fld>
             <a:r>
               <a:rPr lang="en-US" altLang="zh-CN"/>
               <a:t>/43</a:t>
             </a:r>
-            <a:endParaRPr lang="en-US" altLang="zh-CN"/>
           </a:p>
         </p:txBody>
       </p:sp>
@@ -1882,7 +1893,6 @@
               <a:rPr lang="en-US" altLang="zh-CN"/>
               <a:t>Click to edit Master text styles</a:t>
             </a:r>
-            <a:endParaRPr lang="en-US" altLang="zh-CN"/>
           </a:p>
         </p:txBody>
       </p:sp>
@@ -1906,6 +1916,7 @@
             </a:pPr>
             <a:fld id="{AABE4F8E-5AE1-43CC-BD4F-B5E6D27D8DA3}" type="datetime1">
               <a:rPr lang="zh-CN" altLang="en-US" smtClean="0"/>
+              <a:t>2018/11/8</a:t>
             </a:fld>
             <a:endParaRPr lang="en-US" altLang="zh-CN"/>
           </a:p>
@@ -1953,12 +1964,12 @@
             </a:pPr>
             <a:fld id="{9FAFF1DE-EEE8-437C-A843-E0D864A24C4A}" type="slidenum">
               <a:rPr lang="en-US" altLang="zh-CN" smtClean="0"/>
+              <a:t>‹#›</a:t>
             </a:fld>
             <a:r>
               <a:rPr lang="en-US" altLang="zh-CN"/>
               <a:t>/43</a:t>
             </a:r>
-            <a:endParaRPr lang="en-US" altLang="zh-CN"/>
           </a:p>
         </p:txBody>
       </p:sp>
@@ -2109,7 +2120,6 @@
               <a:rPr lang="en-US" altLang="zh-CN" dirty="0"/>
               <a:t>Click to edit Master text styles</a:t>
             </a:r>
-            <a:endParaRPr lang="en-US" altLang="zh-CN" dirty="0"/>
           </a:p>
           <a:p>
             <a:pPr lvl="1"/>
@@ -2117,7 +2127,6 @@
               <a:rPr lang="en-US" altLang="zh-CN" dirty="0"/>
               <a:t>Second level</a:t>
             </a:r>
-            <a:endParaRPr lang="en-US" altLang="zh-CN" dirty="0"/>
           </a:p>
           <a:p>
             <a:pPr lvl="2"/>
@@ -2125,7 +2134,6 @@
               <a:rPr lang="en-US" altLang="zh-CN" dirty="0"/>
               <a:t>Third level</a:t>
             </a:r>
-            <a:endParaRPr lang="en-US" altLang="zh-CN" dirty="0"/>
           </a:p>
           <a:p>
             <a:pPr lvl="3"/>
@@ -2133,7 +2141,6 @@
               <a:rPr lang="en-US" altLang="zh-CN" dirty="0"/>
               <a:t>Fourth level</a:t>
             </a:r>
-            <a:endParaRPr lang="en-US" altLang="zh-CN" dirty="0"/>
           </a:p>
           <a:p>
             <a:pPr lvl="4"/>
@@ -2200,7 +2207,6 @@
               <a:rPr lang="en-US" altLang="zh-CN" dirty="0"/>
               <a:t>Click to edit Master text styles</a:t>
             </a:r>
-            <a:endParaRPr lang="en-US" altLang="zh-CN" dirty="0"/>
           </a:p>
           <a:p>
             <a:pPr lvl="1"/>
@@ -2208,7 +2214,6 @@
               <a:rPr lang="en-US" altLang="zh-CN" dirty="0"/>
               <a:t>Second level</a:t>
             </a:r>
-            <a:endParaRPr lang="en-US" altLang="zh-CN" dirty="0"/>
           </a:p>
           <a:p>
             <a:pPr lvl="2"/>
@@ -2216,7 +2221,6 @@
               <a:rPr lang="en-US" altLang="zh-CN" dirty="0"/>
               <a:t>Third level</a:t>
             </a:r>
-            <a:endParaRPr lang="en-US" altLang="zh-CN" dirty="0"/>
           </a:p>
           <a:p>
             <a:pPr lvl="3"/>
@@ -2224,7 +2228,6 @@
               <a:rPr lang="en-US" altLang="zh-CN" dirty="0"/>
               <a:t>Fourth level</a:t>
             </a:r>
-            <a:endParaRPr lang="en-US" altLang="zh-CN" dirty="0"/>
           </a:p>
           <a:p>
             <a:pPr lvl="4"/>
@@ -2256,6 +2259,7 @@
             </a:pPr>
             <a:fld id="{92592F8A-EE8E-460D-9D29-68D0BAA8AB18}" type="datetime1">
               <a:rPr lang="zh-CN" altLang="en-US" smtClean="0"/>
+              <a:t>2018/11/8</a:t>
             </a:fld>
             <a:endParaRPr lang="en-US" altLang="zh-CN"/>
           </a:p>
@@ -2303,12 +2307,12 @@
             </a:pPr>
             <a:fld id="{9FAFF1DE-EEE8-437C-A843-E0D864A24C4A}" type="slidenum">
               <a:rPr lang="en-US" altLang="zh-CN" smtClean="0"/>
+              <a:t>‹#›</a:t>
             </a:fld>
             <a:r>
               <a:rPr lang="en-US" altLang="zh-CN"/>
               <a:t>/43</a:t>
             </a:r>
-            <a:endParaRPr lang="en-US" altLang="zh-CN"/>
           </a:p>
         </p:txBody>
       </p:sp>
@@ -2470,7 +2474,6 @@
               <a:rPr lang="en-US" altLang="zh-CN" dirty="0"/>
               <a:t>Click to edit Master text styles</a:t>
             </a:r>
-            <a:endParaRPr lang="en-US" altLang="zh-CN" dirty="0"/>
           </a:p>
         </p:txBody>
       </p:sp>
@@ -2529,7 +2532,6 @@
               <a:rPr lang="en-US" altLang="zh-CN" dirty="0"/>
               <a:t>Click to edit Master text styles</a:t>
             </a:r>
-            <a:endParaRPr lang="en-US" altLang="zh-CN" dirty="0"/>
           </a:p>
           <a:p>
             <a:pPr lvl="1"/>
@@ -2537,7 +2539,6 @@
               <a:rPr lang="en-US" altLang="zh-CN" dirty="0"/>
               <a:t>Second level</a:t>
             </a:r>
-            <a:endParaRPr lang="en-US" altLang="zh-CN" dirty="0"/>
           </a:p>
           <a:p>
             <a:pPr lvl="2"/>
@@ -2545,7 +2546,6 @@
               <a:rPr lang="en-US" altLang="zh-CN" dirty="0"/>
               <a:t>Third level</a:t>
             </a:r>
-            <a:endParaRPr lang="en-US" altLang="zh-CN" dirty="0"/>
           </a:p>
           <a:p>
             <a:pPr lvl="3"/>
@@ -2553,7 +2553,6 @@
               <a:rPr lang="en-US" altLang="zh-CN" dirty="0"/>
               <a:t>Fourth level</a:t>
             </a:r>
-            <a:endParaRPr lang="en-US" altLang="zh-CN" dirty="0"/>
           </a:p>
           <a:p>
             <a:pPr lvl="4"/>
@@ -2627,7 +2626,6 @@
               <a:rPr lang="en-US" altLang="zh-CN" dirty="0"/>
               <a:t>Click to edit Master text styles</a:t>
             </a:r>
-            <a:endParaRPr lang="en-US" altLang="zh-CN" dirty="0"/>
           </a:p>
         </p:txBody>
       </p:sp>
@@ -2686,7 +2684,6 @@
               <a:rPr lang="en-US" altLang="zh-CN" dirty="0"/>
               <a:t>Click to edit Master text styles</a:t>
             </a:r>
-            <a:endParaRPr lang="en-US" altLang="zh-CN" dirty="0"/>
           </a:p>
           <a:p>
             <a:pPr lvl="1"/>
@@ -2694,7 +2691,6 @@
               <a:rPr lang="en-US" altLang="zh-CN" dirty="0"/>
               <a:t>Second level</a:t>
             </a:r>
-            <a:endParaRPr lang="en-US" altLang="zh-CN" dirty="0"/>
           </a:p>
           <a:p>
             <a:pPr lvl="2"/>
@@ -2702,7 +2698,6 @@
               <a:rPr lang="en-US" altLang="zh-CN" dirty="0"/>
               <a:t>Third level</a:t>
             </a:r>
-            <a:endParaRPr lang="en-US" altLang="zh-CN" dirty="0"/>
           </a:p>
           <a:p>
             <a:pPr lvl="3"/>
@@ -2710,7 +2705,6 @@
               <a:rPr lang="en-US" altLang="zh-CN" dirty="0"/>
               <a:t>Fourth level</a:t>
             </a:r>
-            <a:endParaRPr lang="en-US" altLang="zh-CN" dirty="0"/>
           </a:p>
           <a:p>
             <a:pPr lvl="4"/>
@@ -2742,6 +2736,7 @@
             </a:pPr>
             <a:fld id="{5C6E5FBA-B8E2-45B4-A106-350BAF8FCF13}" type="datetime1">
               <a:rPr lang="zh-CN" altLang="en-US" smtClean="0"/>
+              <a:t>2018/11/8</a:t>
             </a:fld>
             <a:endParaRPr lang="en-US" altLang="zh-CN"/>
           </a:p>
@@ -2789,12 +2784,12 @@
             </a:pPr>
             <a:fld id="{9FAFF1DE-EEE8-437C-A843-E0D864A24C4A}" type="slidenum">
               <a:rPr lang="en-US" altLang="zh-CN" smtClean="0"/>
+              <a:t>‹#›</a:t>
             </a:fld>
             <a:r>
               <a:rPr lang="en-US" altLang="zh-CN"/>
               <a:t>/43</a:t>
             </a:r>
-            <a:endParaRPr lang="en-US" altLang="zh-CN"/>
           </a:p>
         </p:txBody>
       </p:sp>
@@ -2914,6 +2909,7 @@
             </a:pPr>
             <a:fld id="{BAD7ECE6-A99C-4B8F-A384-BA99EAA90741}" type="datetime1">
               <a:rPr lang="zh-CN" altLang="en-US" smtClean="0"/>
+              <a:t>2018/11/8</a:t>
             </a:fld>
             <a:endParaRPr lang="en-US" altLang="zh-CN"/>
           </a:p>
@@ -2961,12 +2957,12 @@
             </a:pPr>
             <a:fld id="{9FAFF1DE-EEE8-437C-A843-E0D864A24C4A}" type="slidenum">
               <a:rPr lang="en-US" altLang="zh-CN" smtClean="0"/>
+              <a:t>‹#›</a:t>
             </a:fld>
             <a:r>
               <a:rPr lang="en-US" altLang="zh-CN"/>
               <a:t>/43</a:t>
             </a:r>
-            <a:endParaRPr lang="en-US" altLang="zh-CN"/>
           </a:p>
         </p:txBody>
       </p:sp>
@@ -3015,6 +3011,7 @@
             </a:pPr>
             <a:fld id="{ABBDCB34-7DBE-4767-87E0-158278F60A97}" type="datetime1">
               <a:rPr lang="zh-CN" altLang="en-US" smtClean="0"/>
+              <a:t>2018/11/8</a:t>
             </a:fld>
             <a:endParaRPr lang="en-US" altLang="zh-CN"/>
           </a:p>
@@ -3062,12 +3059,12 @@
             </a:pPr>
             <a:fld id="{9FAFF1DE-EEE8-437C-A843-E0D864A24C4A}" type="slidenum">
               <a:rPr lang="en-US" altLang="zh-CN" smtClean="0"/>
+              <a:t>‹#›</a:t>
             </a:fld>
             <a:r>
               <a:rPr lang="en-US" altLang="zh-CN"/>
               <a:t>/43</a:t>
             </a:r>
-            <a:endParaRPr lang="en-US" altLang="zh-CN"/>
           </a:p>
         </p:txBody>
       </p:sp>
@@ -3183,7 +3180,6 @@
               <a:rPr lang="en-US" altLang="zh-CN" dirty="0"/>
               <a:t>Click to edit Master text styles</a:t>
             </a:r>
-            <a:endParaRPr lang="en-US" altLang="zh-CN" dirty="0"/>
           </a:p>
           <a:p>
             <a:pPr lvl="1"/>
@@ -3191,7 +3187,6 @@
               <a:rPr lang="en-US" altLang="zh-CN" dirty="0"/>
               <a:t>Second level</a:t>
             </a:r>
-            <a:endParaRPr lang="en-US" altLang="zh-CN" dirty="0"/>
           </a:p>
           <a:p>
             <a:pPr lvl="2"/>
@@ -3199,7 +3194,6 @@
               <a:rPr lang="en-US" altLang="zh-CN" dirty="0"/>
               <a:t>Third level</a:t>
             </a:r>
-            <a:endParaRPr lang="en-US" altLang="zh-CN" dirty="0"/>
           </a:p>
           <a:p>
             <a:pPr lvl="3"/>
@@ -3207,7 +3201,6 @@
               <a:rPr lang="en-US" altLang="zh-CN" dirty="0"/>
               <a:t>Fourth level</a:t>
             </a:r>
-            <a:endParaRPr lang="en-US" altLang="zh-CN" dirty="0"/>
           </a:p>
           <a:p>
             <a:pPr lvl="4"/>
@@ -3281,7 +3274,6 @@
               <a:rPr lang="en-US" altLang="zh-CN"/>
               <a:t>Click to edit Master text styles</a:t>
             </a:r>
-            <a:endParaRPr lang="en-US" altLang="zh-CN"/>
           </a:p>
         </p:txBody>
       </p:sp>
@@ -3305,6 +3297,7 @@
             </a:pPr>
             <a:fld id="{D90A877D-6939-456F-8107-7DD727CFE7BC}" type="datetime1">
               <a:rPr lang="zh-CN" altLang="en-US" smtClean="0"/>
+              <a:t>2018/11/8</a:t>
             </a:fld>
             <a:endParaRPr lang="en-US" altLang="zh-CN"/>
           </a:p>
@@ -3352,12 +3345,12 @@
             </a:pPr>
             <a:fld id="{9FAFF1DE-EEE8-437C-A843-E0D864A24C4A}" type="slidenum">
               <a:rPr lang="en-US" altLang="zh-CN" smtClean="0"/>
+              <a:t>‹#›</a:t>
             </a:fld>
             <a:r>
               <a:rPr lang="en-US" altLang="zh-CN"/>
               <a:t>/43</a:t>
             </a:r>
-            <a:endParaRPr lang="en-US" altLang="zh-CN"/>
           </a:p>
         </p:txBody>
       </p:sp>
@@ -3541,7 +3534,6 @@
               <a:rPr lang="en-US" altLang="zh-CN"/>
               <a:t>Click to edit Master text styles</a:t>
             </a:r>
-            <a:endParaRPr lang="en-US" altLang="zh-CN"/>
           </a:p>
         </p:txBody>
       </p:sp>
@@ -3565,6 +3557,7 @@
             </a:pPr>
             <a:fld id="{B56E95FF-4ADD-4B08-978D-91FB98898C38}" type="datetime1">
               <a:rPr lang="zh-CN" altLang="en-US" smtClean="0"/>
+              <a:t>2018/11/8</a:t>
             </a:fld>
             <a:endParaRPr lang="en-US" altLang="zh-CN"/>
           </a:p>
@@ -3612,12 +3605,12 @@
             </a:pPr>
             <a:fld id="{9FAFF1DE-EEE8-437C-A843-E0D864A24C4A}" type="slidenum">
               <a:rPr lang="en-US" altLang="zh-CN" smtClean="0"/>
+              <a:t>‹#›</a:t>
             </a:fld>
             <a:r>
               <a:rPr lang="en-US" altLang="zh-CN"/>
               <a:t>/43</a:t>
             </a:r>
-            <a:endParaRPr lang="en-US" altLang="zh-CN"/>
           </a:p>
         </p:txBody>
       </p:sp>
@@ -3635,7 +3628,7 @@
     <p:bg>
       <p:bgPr>
         <a:blipFill dpi="0" rotWithShape="1">
-          <a:blip r:embed="rId12" cstate="print">
+          <a:blip r:embed="rId13" cstate="print">
             <a:alphaModFix amt="18000"/>
             <a:lum/>
           </a:blip>
@@ -3743,7 +3736,6 @@
               <a:rPr lang="en-US" altLang="zh-CN" dirty="0"/>
               <a:t>Click to edit Master text styles</a:t>
             </a:r>
-            <a:endParaRPr lang="en-US" altLang="zh-CN" dirty="0"/>
           </a:p>
           <a:p>
             <a:pPr lvl="1"/>
@@ -3751,7 +3743,6 @@
               <a:rPr lang="en-US" altLang="zh-CN" dirty="0"/>
               <a:t>Second level</a:t>
             </a:r>
-            <a:endParaRPr lang="en-US" altLang="zh-CN" dirty="0"/>
           </a:p>
           <a:p>
             <a:pPr lvl="2"/>
@@ -3759,7 +3750,6 @@
               <a:rPr lang="en-US" altLang="zh-CN" dirty="0"/>
               <a:t>Third level</a:t>
             </a:r>
-            <a:endParaRPr lang="en-US" altLang="zh-CN" dirty="0"/>
           </a:p>
           <a:p>
             <a:pPr lvl="3"/>
@@ -3767,7 +3757,6 @@
               <a:rPr lang="en-US" altLang="zh-CN" dirty="0"/>
               <a:t>Fourth level</a:t>
             </a:r>
-            <a:endParaRPr lang="en-US" altLang="zh-CN" dirty="0"/>
           </a:p>
           <a:p>
             <a:pPr lvl="4"/>
@@ -3817,6 +3806,7 @@
             </a:pPr>
             <a:fld id="{B78EDA37-F8C5-4688-9D54-BF6E27492CB1}" type="datetime1">
               <a:rPr lang="zh-CN" altLang="en-US" smtClean="0"/>
+              <a:t>2018/11/8</a:t>
             </a:fld>
             <a:endParaRPr lang="en-US" altLang="zh-CN"/>
           </a:p>
@@ -3900,12 +3890,12 @@
             </a:pPr>
             <a:fld id="{9FAFF1DE-EEE8-437C-A843-E0D864A24C4A}" type="slidenum">
               <a:rPr lang="en-US" altLang="zh-CN" smtClean="0"/>
+              <a:t>‹#›</a:t>
             </a:fld>
             <a:r>
               <a:rPr lang="en-US" altLang="zh-CN"/>
               <a:t>/43</a:t>
             </a:r>
-            <a:endParaRPr lang="en-US" altLang="zh-CN"/>
           </a:p>
         </p:txBody>
       </p:sp>
@@ -4212,7 +4202,7 @@
           <p:nvPr/>
         </p:nvPicPr>
         <p:blipFill>
-          <a:blip r:embed="rId1" cstate="print">
+          <a:blip r:embed="rId3" cstate="print">
             <a:clrChange>
               <a:clrFrom>
                 <a:srgbClr val="FFFFFF"/>
@@ -4311,14 +4301,11 @@
               <a:defRPr/>
             </a:pPr>
             <a:r>
-              <a:rPr lang="zh-CN" altLang="en-US" dirty="0" smtClean="0">
+              <a:rPr lang="zh-CN" altLang="en-US" dirty="0">
                 <a:sym typeface="Arial" panose="02080604020202020204" pitchFamily="34" charset="0"/>
               </a:rPr>
               <a:t>运行条件</a:t>
             </a:r>
-            <a:endParaRPr lang="zh-CN" altLang="en-US" dirty="0">
-              <a:sym typeface="Arial" panose="02080604020202020204" pitchFamily="34" charset="0"/>
-            </a:endParaRPr>
           </a:p>
         </p:txBody>
       </p:sp>
@@ -4359,7 +4346,7 @@
               <a:buChar char="Ø"/>
             </a:pPr>
             <a:r>
-              <a:rPr lang="zh-CN" altLang="en-US" sz="2200" dirty="0" smtClean="0">
+              <a:rPr lang="zh-CN" altLang="en-US" sz="2200" dirty="0">
                 <a:solidFill>
                   <a:srgbClr val="0000CC"/>
                 </a:solidFill>
@@ -4378,13 +4365,6 @@
               </a:rPr>
               <a:t>50°</a:t>
             </a:r>
-            <a:endParaRPr lang="en-US" altLang="zh-CN" sz="2200" dirty="0">
-              <a:solidFill>
-                <a:srgbClr val="0000CC"/>
-              </a:solidFill>
-              <a:latin typeface="+mn-lt"/>
-              <a:cs typeface="Arial" panose="02080604020202020204" pitchFamily="34" charset="0"/>
-            </a:endParaRPr>
           </a:p>
           <a:p>
             <a:pPr algn="l">
@@ -4396,7 +4376,7 @@
               <a:buChar char="Ø"/>
             </a:pPr>
             <a:r>
-              <a:rPr lang="zh-CN" altLang="en-US" sz="2200" dirty="0" smtClean="0">
+              <a:rPr lang="zh-CN" altLang="en-US" sz="2200" dirty="0">
                 <a:solidFill>
                   <a:srgbClr val="0000CC"/>
                 </a:solidFill>
@@ -4406,32 +4386,15 @@
               <a:t> 视轴与月球夹角 ≥</a:t>
             </a:r>
             <a:r>
-              <a:rPr lang="en-US" altLang="zh-CN" sz="2200" dirty="0" smtClean="0">
+              <a:rPr lang="en-US" altLang="zh-CN" sz="2200" dirty="0">
                 <a:solidFill>
                   <a:srgbClr val="0000CC"/>
                 </a:solidFill>
                 <a:latin typeface="+mn-lt"/>
                 <a:cs typeface="Arial" panose="02080604020202020204" pitchFamily="34" charset="0"/>
               </a:rPr>
-              <a:t>40</a:t>
-            </a:r>
-            <a:r>
-              <a:rPr lang="en-US" altLang="zh-CN" sz="2200" dirty="0">
-                <a:solidFill>
-                  <a:srgbClr val="0000CC"/>
-                </a:solidFill>
-                <a:latin typeface="+mn-lt"/>
-                <a:cs typeface="Arial" panose="02080604020202020204" pitchFamily="34" charset="0"/>
-              </a:rPr>
-              <a:t>°</a:t>
-            </a:r>
-            <a:endParaRPr lang="en-US" altLang="zh-CN" sz="2200" dirty="0">
-              <a:solidFill>
-                <a:srgbClr val="0000CC"/>
-              </a:solidFill>
-              <a:latin typeface="+mn-lt"/>
-              <a:cs typeface="Arial" panose="02080604020202020204" pitchFamily="34" charset="0"/>
-            </a:endParaRPr>
+              <a:t>40°</a:t>
+            </a:r>
           </a:p>
           <a:p>
             <a:pPr algn="l">
@@ -4450,30 +4413,20 @@
                 <a:latin typeface="+mn-lt"/>
                 <a:cs typeface="Arial" panose="02080604020202020204" pitchFamily="34" charset="0"/>
               </a:rPr>
-              <a:t> </a:t>
-            </a:r>
-            <a:r>
-              <a:rPr lang="zh-CN" altLang="en-US" sz="2200" dirty="0" smtClean="0">
+              <a:t> 视轴与地平线夹角≥</a:t>
+            </a:r>
+            <a:r>
+              <a:rPr lang="en-US" altLang="zh-CN" sz="2200" dirty="0">
                 <a:solidFill>
                   <a:srgbClr val="0000CC"/>
                 </a:solidFill>
                 <a:latin typeface="+mn-lt"/>
                 <a:cs typeface="Arial" panose="02080604020202020204" pitchFamily="34" charset="0"/>
               </a:rPr>
-              <a:t>视轴与地平线夹角≥</a:t>
-            </a:r>
-            <a:r>
-              <a:rPr lang="en-US" altLang="zh-CN" sz="2200" dirty="0" smtClean="0">
-                <a:solidFill>
-                  <a:srgbClr val="0000CC"/>
-                </a:solidFill>
-                <a:latin typeface="+mn-lt"/>
-                <a:cs typeface="Arial" panose="02080604020202020204" pitchFamily="34" charset="0"/>
-              </a:rPr>
               <a:t>70</a:t>
             </a:r>
             <a:r>
-              <a:rPr lang="en-US" altLang="zh-CN" sz="2200" dirty="0" smtClean="0">
+              <a:rPr lang="en-US" altLang="zh-CN" sz="2200" dirty="0">
                 <a:solidFill>
                   <a:srgbClr val="0000CC"/>
                 </a:solidFill>
@@ -4484,7 +4437,7 @@
               <a:t></a:t>
             </a:r>
             <a:r>
-              <a:rPr lang="en-US" altLang="zh-CN" sz="2200" dirty="0" smtClean="0">
+              <a:rPr lang="en-US" altLang="zh-CN" sz="2200" dirty="0">
                 <a:solidFill>
                   <a:srgbClr val="0000CC"/>
                 </a:solidFill>
@@ -4494,7 +4447,7 @@
               <a:t>/30</a:t>
             </a:r>
             <a:r>
-              <a:rPr lang="en-US" altLang="zh-CN" sz="2200" dirty="0" smtClean="0">
+              <a:rPr lang="en-US" altLang="zh-CN" sz="2200" dirty="0">
                 <a:solidFill>
                   <a:srgbClr val="0000CC"/>
                 </a:solidFill>
@@ -4503,7 +4456,7 @@
               </a:rPr>
               <a:t></a:t>
             </a:r>
-            <a:endParaRPr lang="en-US" altLang="zh-CN" sz="2200" dirty="0" smtClean="0">
+            <a:endParaRPr lang="en-US" altLang="zh-CN" sz="2200" dirty="0">
               <a:solidFill>
                 <a:srgbClr val="0000CC"/>
               </a:solidFill>
@@ -4521,7 +4474,7 @@
               <a:buChar char="Ø"/>
             </a:pPr>
             <a:r>
-              <a:rPr lang="zh-CN" altLang="en-US" sz="2200" dirty="0" smtClean="0">
+              <a:rPr lang="zh-CN" altLang="en-US" sz="2200" dirty="0">
                 <a:solidFill>
                   <a:srgbClr val="0000CC"/>
                 </a:solidFill>
@@ -4530,7 +4483,7 @@
               </a:rPr>
               <a:t> 视场拼接</a:t>
             </a:r>
-            <a:endParaRPr lang="en-US" altLang="zh-CN" sz="2200" dirty="0" smtClean="0">
+            <a:endParaRPr lang="en-US" altLang="zh-CN" sz="2200" dirty="0">
               <a:solidFill>
                 <a:srgbClr val="0000CC"/>
               </a:solidFill>
@@ -4548,7 +4501,7 @@
               <a:buChar char="Ø"/>
             </a:pPr>
             <a:r>
-              <a:rPr lang="zh-CN" altLang="en-US" sz="2200" dirty="0" smtClean="0">
+              <a:rPr lang="zh-CN" altLang="en-US" sz="2200" dirty="0">
                 <a:solidFill>
                   <a:srgbClr val="0000CC"/>
                 </a:solidFill>
@@ -4557,7 +4510,7 @@
               </a:rPr>
               <a:t> 望远镜转动与稳定时间</a:t>
             </a:r>
-            <a:endParaRPr lang="en-US" altLang="zh-CN" sz="2200" dirty="0" smtClean="0">
+            <a:endParaRPr lang="en-US" altLang="zh-CN" sz="2200" dirty="0">
               <a:solidFill>
                 <a:srgbClr val="0000CC"/>
               </a:solidFill>
@@ -4575,7 +4528,7 @@
               <a:buChar char="Ø"/>
             </a:pPr>
             <a:r>
-              <a:rPr lang="zh-CN" altLang="en-US" sz="2200" dirty="0" smtClean="0">
+              <a:rPr lang="zh-CN" altLang="en-US" sz="2200" dirty="0">
                 <a:solidFill>
                   <a:srgbClr val="0000CC"/>
                 </a:solidFill>
@@ -4585,7 +4538,7 @@
               <a:t> 能源平衡，</a:t>
             </a:r>
             <a:r>
-              <a:rPr lang="en-US" altLang="zh-CN" sz="2200" dirty="0" smtClean="0">
+              <a:rPr lang="en-US" altLang="zh-CN" sz="2200" dirty="0">
                 <a:solidFill>
                   <a:srgbClr val="0000CC"/>
                 </a:solidFill>
@@ -4595,7 +4548,7 @@
               <a:t>CMG</a:t>
             </a:r>
             <a:r>
-              <a:rPr lang="zh-CN" altLang="en-US" sz="2200" dirty="0" smtClean="0">
+              <a:rPr lang="zh-CN" altLang="en-US" sz="2200" dirty="0">
                 <a:solidFill>
                   <a:srgbClr val="0000CC"/>
                 </a:solidFill>
@@ -4604,7 +4557,7 @@
               </a:rPr>
               <a:t>散热</a:t>
             </a:r>
-            <a:endParaRPr lang="en-US" altLang="zh-CN" sz="2200" dirty="0" smtClean="0">
+            <a:endParaRPr lang="en-US" altLang="zh-CN" sz="2200" dirty="0">
               <a:solidFill>
                 <a:srgbClr val="0000CC"/>
               </a:solidFill>
@@ -4622,7 +4575,7 @@
               <a:buChar char="Ø"/>
             </a:pPr>
             <a:r>
-              <a:rPr lang="zh-CN" altLang="en-US" sz="2200" dirty="0" smtClean="0">
+              <a:rPr lang="zh-CN" altLang="en-US" sz="2200" dirty="0">
                 <a:solidFill>
                   <a:srgbClr val="0000CC"/>
                 </a:solidFill>
@@ -4631,13 +4584,6 @@
               </a:rPr>
               <a:t>切换中继卫星</a:t>
             </a:r>
-            <a:endParaRPr lang="zh-CN" altLang="en-US" sz="2200" dirty="0" smtClean="0">
-              <a:solidFill>
-                <a:srgbClr val="0000CC"/>
-              </a:solidFill>
-              <a:latin typeface="+mn-lt"/>
-              <a:cs typeface="Arial" panose="02080604020202020204" pitchFamily="34" charset="0"/>
-            </a:endParaRPr>
           </a:p>
           <a:p>
             <a:pPr marL="271780" indent="-271780" algn="l">
@@ -4649,7 +4595,7 @@
               <a:buChar char="Ø"/>
             </a:pPr>
             <a:r>
-              <a:rPr lang="zh-CN" altLang="en-US" sz="2200" dirty="0" smtClean="0">
+              <a:rPr lang="zh-CN" altLang="en-US" sz="2200" dirty="0">
                 <a:solidFill>
                   <a:srgbClr val="0000CC"/>
                 </a:solidFill>
@@ -4658,7 +4604,7 @@
               </a:rPr>
               <a:t>南大西洋异常区待机</a:t>
             </a:r>
-            <a:endParaRPr lang="en-US" altLang="zh-CN" sz="2200" dirty="0" smtClean="0">
+            <a:endParaRPr lang="en-US" altLang="zh-CN" sz="2200" dirty="0">
               <a:solidFill>
                 <a:srgbClr val="0000CC"/>
               </a:solidFill>
@@ -4676,7 +4622,7 @@
               <a:buChar char="Ø"/>
             </a:pPr>
             <a:r>
-              <a:rPr lang="zh-CN" altLang="en-US" sz="2200" dirty="0" smtClean="0">
+              <a:rPr lang="zh-CN" altLang="en-US" sz="2200" dirty="0">
                 <a:solidFill>
                   <a:srgbClr val="0000CC"/>
                 </a:solidFill>
@@ -4685,7 +4631,7 @@
               </a:rPr>
               <a:t>定期补给、维护、轨控</a:t>
             </a:r>
-            <a:endParaRPr lang="en-US" altLang="zh-CN" sz="2200" dirty="0" smtClean="0">
+            <a:endParaRPr lang="en-US" altLang="zh-CN" sz="2200" dirty="0">
               <a:solidFill>
                 <a:srgbClr val="0000CC"/>
               </a:solidFill>
@@ -4703,7 +4649,7 @@
               <a:buChar char="Ø"/>
             </a:pPr>
             <a:r>
-              <a:rPr lang="en-US" altLang="zh-CN" sz="2200" dirty="0" smtClean="0">
+              <a:rPr lang="en-US" altLang="zh-CN" sz="2200" dirty="0">
                 <a:solidFill>
                   <a:srgbClr val="0000CC"/>
                 </a:solidFill>
@@ -4712,13 +4658,6 @@
               </a:rPr>
               <a:t>…</a:t>
             </a:r>
-            <a:endParaRPr lang="en-US" altLang="zh-CN" sz="2200" dirty="0" smtClean="0">
-              <a:solidFill>
-                <a:srgbClr val="0000CC"/>
-              </a:solidFill>
-              <a:latin typeface="+mn-lt"/>
-              <a:cs typeface="Arial" panose="02080604020202020204" pitchFamily="34" charset="0"/>
-            </a:endParaRPr>
           </a:p>
         </p:txBody>
       </p:sp>
@@ -4804,12 +4743,12 @@
           <a:graphicData uri="http://schemas.openxmlformats.org/presentationml/2006/ole">
             <mc:AlternateContent xmlns:mc="http://schemas.openxmlformats.org/markup-compatibility/2006">
               <mc:Choice xmlns:v="urn:schemas-microsoft-com:vml" Requires="v">
-                <p:oleObj spid="_x0000_s1025" name="Visio" r:id="rId2" imgW="8051800" imgH="6337300" progId="Visio.Drawing.11">
+                <p:oleObj spid="_x0000_s1061" name="Visio" r:id="rId4" imgW="8051800" imgH="6337300" progId="Visio.Drawing.11">
                   <p:embed/>
                 </p:oleObj>
               </mc:Choice>
               <mc:Fallback>
-                <p:oleObj name="Visio" r:id="rId2" imgW="8051800" imgH="6337300" progId="Visio.Drawing.11">
+                <p:oleObj name="Visio" r:id="rId4" imgW="8051800" imgH="6337300" progId="Visio.Drawing.11">
                   <p:embed/>
                   <p:pic>
                     <p:nvPicPr>
@@ -4820,7 +4759,7 @@
                       <p:nvPr/>
                     </p:nvPicPr>
                     <p:blipFill>
-                      <a:blip r:embed="rId3"/>
+                      <a:blip r:embed="rId5"/>
                       <a:stretch>
                         <a:fillRect/>
                       </a:stretch>
@@ -4866,7 +4805,7 @@
             <p:nvPr/>
           </p:nvPicPr>
           <p:blipFill>
-            <a:blip r:embed="rId4" cstate="print">
+            <a:blip r:embed="rId6" cstate="print">
               <a:clrChange>
                 <a:clrFrom>
                   <a:srgbClr val="FFFFFF"/>
@@ -4916,7 +4855,7 @@
             <a:lstStyle/>
             <a:p>
               <a:r>
-                <a:rPr lang="en-US" altLang="zh-CN" b="1" dirty="0" smtClean="0"/>
+                <a:rPr lang="en-US" altLang="zh-CN" b="1" dirty="0"/>
                 <a:t>SAA</a:t>
               </a:r>
               <a:endParaRPr lang="zh-CN" altLang="en-US" b="1" dirty="0"/>
@@ -4929,13 +4868,6 @@
   <p:clrMapOvr>
     <a:masterClrMapping/>
   </p:clrMapOvr>
-  <p:timing>
-    <p:tnLst>
-      <p:par>
-        <p:cTn id="1" dur="indefinite" restart="never" nodeType="tmRoot"/>
-      </p:par>
-    </p:tnLst>
-  </p:timing>
 </p:sld>
 </file>
 
@@ -5004,7 +4936,7 @@
               <a:defRPr/>
             </a:pPr>
             <a:r>
-              <a:rPr smtClean="0">
+              <a:rPr>
                 <a:sym typeface="Arial" panose="02080604020202020204" pitchFamily="34" charset="0"/>
               </a:rPr>
               <a:t>运行仿真结果</a:t>
@@ -5023,8 +4955,8 @@
         </p:nvSpPr>
         <p:spPr>
           <a:xfrm>
-            <a:off x="103505" y="4839335"/>
-            <a:ext cx="4773295" cy="1745615"/>
+            <a:off x="468000" y="5400000"/>
+            <a:ext cx="4320000" cy="1092607"/>
           </a:xfrm>
           <a:prstGeom prst="rect">
             <a:avLst/>
@@ -5037,141 +4969,111 @@
           </a:bodyPr>
           <a:lstStyle/>
           <a:p>
-            <a:pPr algn="just">
+            <a:pPr>
               <a:spcBef>
                 <a:spcPts val="300"/>
               </a:spcBef>
             </a:pPr>
             <a:r>
-              <a:rPr lang="en-US" altLang="zh-CN" dirty="0">
-                <a:solidFill>
-                  <a:schemeClr val="tx1"/>
-                </a:solidFill>
-                <a:latin typeface="+mn-lt"/>
-                <a:ea typeface="黑体" pitchFamily="49" charset="-122"/>
-              </a:rPr>
-              <a:t>Th</a:t>
-            </a:r>
-            <a:r>
-              <a:rPr lang="en-US" altLang="zh-CN" dirty="0">
-                <a:solidFill>
-                  <a:schemeClr val="tx1"/>
-                </a:solidFill>
-                <a:latin typeface="+mn-lt"/>
-              </a:rPr>
-              <a:t>e Galactic plane &amp; ecliptic plane can be observed!</a:t>
+              <a:rPr lang="zh-CN" altLang="en-US" dirty="0">
+                <a:solidFill>
+                  <a:srgbClr val="0070C0"/>
+                </a:solidFill>
+              </a:rPr>
+              <a:t>新方案</a:t>
             </a:r>
             <a:endParaRPr lang="en-US" altLang="zh-CN" dirty="0">
               <a:solidFill>
-                <a:schemeClr val="tx1"/>
+                <a:srgbClr val="0070C0"/>
               </a:solidFill>
-              <a:latin typeface="+mn-lt"/>
             </a:endParaRPr>
           </a:p>
           <a:p>
-            <a:pPr algn="just">
+            <a:pPr>
               <a:spcBef>
                 <a:spcPts val="300"/>
               </a:spcBef>
             </a:pPr>
             <a:r>
+              <a:rPr lang="zh-CN" altLang="en-US" dirty="0">
+                <a:solidFill>
+                  <a:srgbClr val="0070C0"/>
+                </a:solidFill>
+              </a:rPr>
+              <a:t>深度多色成像</a:t>
+            </a:r>
+            <a:r>
               <a:rPr lang="en-US" altLang="zh-CN" dirty="0">
                 <a:solidFill>
                   <a:srgbClr val="0070C0"/>
                 </a:solidFill>
-                <a:latin typeface="+mn-lt"/>
-                <a:ea typeface="黑体" pitchFamily="49" charset="-122"/>
-              </a:rPr>
-              <a:t>Wide-Field: </a:t>
-            </a:r>
-            <a:r>
-              <a:rPr lang="en-US" altLang="en-US" dirty="0">
+              </a:rPr>
+              <a:t> </a:t>
+            </a:r>
+            <a:r>
+              <a:rPr lang="zh-CN" altLang="en-US" dirty="0">
                 <a:solidFill>
                   <a:srgbClr val="0070C0"/>
                 </a:solidFill>
-                <a:latin typeface="+mn-lt"/>
-                <a:ea typeface="黑体" pitchFamily="49" charset="-122"/>
-              </a:rPr>
-              <a:t>19353</a:t>
+              </a:rPr>
+              <a:t>    </a:t>
             </a:r>
             <a:r>
               <a:rPr lang="en-US" altLang="zh-CN" dirty="0">
                 <a:solidFill>
                   <a:srgbClr val="0070C0"/>
                 </a:solidFill>
-                <a:latin typeface="+mn-lt"/>
-                <a:ea typeface="黑体" pitchFamily="49" charset="-122"/>
-              </a:rPr>
-              <a:t> deg^2</a:t>
+              </a:rPr>
+              <a:t>19535</a:t>
+            </a:r>
+            <a:r>
+              <a:rPr lang="zh-CN" altLang="en-US" dirty="0">
+                <a:solidFill>
+                  <a:srgbClr val="0070C0"/>
+                </a:solidFill>
+              </a:rPr>
+              <a:t> 平方度</a:t>
             </a:r>
             <a:endParaRPr lang="en-US" altLang="zh-CN" dirty="0">
               <a:solidFill>
                 <a:srgbClr val="0070C0"/>
               </a:solidFill>
-              <a:latin typeface="+mn-lt"/>
-              <a:ea typeface="黑体" pitchFamily="49" charset="-122"/>
             </a:endParaRPr>
           </a:p>
           <a:p>
-            <a:pPr algn="just">
+            <a:pPr>
               <a:spcBef>
                 <a:spcPts val="300"/>
               </a:spcBef>
             </a:pPr>
             <a:r>
+              <a:rPr lang="zh-CN" altLang="en-US" dirty="0">
+                <a:solidFill>
+                  <a:srgbClr val="0070C0"/>
+                </a:solidFill>
+              </a:rPr>
+              <a:t>极深度多色成像     </a:t>
+            </a:r>
+            <a:r>
               <a:rPr lang="en-US" altLang="zh-CN" dirty="0">
                 <a:solidFill>
                   <a:srgbClr val="0070C0"/>
                 </a:solidFill>
-                <a:latin typeface="+mn-lt"/>
-              </a:rPr>
-              <a:t>Ultra-Deep: </a:t>
-            </a:r>
-            <a:r>
-              <a:rPr lang="en-US" altLang="en-US" dirty="0">
+              </a:rPr>
+              <a:t>380</a:t>
+            </a:r>
+            <a:r>
+              <a:rPr lang="zh-CN" altLang="en-US" dirty="0">
                 <a:solidFill>
                   <a:srgbClr val="0070C0"/>
                 </a:solidFill>
-                <a:latin typeface="+mn-lt"/>
-              </a:rPr>
-              <a:t>380    </a:t>
-            </a:r>
-            <a:r>
-              <a:rPr lang="en-US" altLang="zh-CN" dirty="0">
-                <a:solidFill>
-                  <a:srgbClr val="0070C0"/>
-                </a:solidFill>
-                <a:latin typeface="+mn-lt"/>
-              </a:rPr>
-              <a:t>deg^2</a:t>
+              </a:rPr>
+              <a:t> 平方度</a:t>
             </a:r>
             <a:endParaRPr lang="en-US" altLang="zh-CN" dirty="0">
               <a:solidFill>
                 <a:srgbClr val="0070C0"/>
               </a:solidFill>
-              <a:latin typeface="+mn-lt"/>
-            </a:endParaRPr>
-          </a:p>
-          <a:p>
-            <a:pPr algn="just">
-              <a:spcBef>
-                <a:spcPts val="300"/>
-              </a:spcBef>
-            </a:pPr>
-            <a:r>
-              <a:rPr lang="en-US" altLang="zh-CN" dirty="0">
-                <a:solidFill>
-                  <a:srgbClr val="0070C0"/>
-                </a:solidFill>
-                <a:latin typeface="+mn-lt"/>
-              </a:rPr>
-              <a:t>obs-time ~ 62%</a:t>
-            </a:r>
-            <a:endParaRPr lang="en-US" altLang="zh-CN" dirty="0">
-              <a:solidFill>
-                <a:srgbClr val="0070C0"/>
-              </a:solidFill>
-              <a:latin typeface="+mn-lt"/>
             </a:endParaRPr>
           </a:p>
         </p:txBody>
@@ -5185,7 +5087,7 @@
           <p:nvPr/>
         </p:nvPicPr>
         <p:blipFill>
-          <a:blip r:embed="rId1"/>
+          <a:blip r:embed="rId2"/>
           <a:srcRect/>
           <a:stretch>
             <a:fillRect/>
@@ -5193,8 +5095,8 @@
         </p:blipFill>
         <p:spPr>
           <a:xfrm>
-            <a:off x="36513" y="1285240"/>
-            <a:ext cx="4839970" cy="3630295"/>
+            <a:off x="270000" y="1440000"/>
+            <a:ext cx="4680000" cy="3510307"/>
           </a:xfrm>
           <a:prstGeom prst="rect">
             <a:avLst/>
@@ -5208,7 +5110,7 @@
           <p:nvPr/>
         </p:nvPicPr>
         <p:blipFill>
-          <a:blip r:embed="rId2"/>
+          <a:blip r:embed="rId3"/>
           <a:srcRect/>
           <a:stretch>
             <a:fillRect/>
@@ -5216,8 +5118,8 @@
         </p:blipFill>
         <p:spPr bwMode="auto">
           <a:xfrm>
-            <a:off x="5125720" y="969010"/>
-            <a:ext cx="3385185" cy="4714240"/>
+            <a:off x="5220000" y="900000"/>
+            <a:ext cx="3600000" cy="4860000"/>
           </a:xfrm>
           <a:prstGeom prst="rect">
             <a:avLst/>
@@ -5251,12 +5153,12 @@
             </a:pPr>
             <a:fld id="{9FAFF1DE-EEE8-437C-A843-E0D864A24C4A}" type="slidenum">
               <a:rPr lang="en-US" altLang="zh-CN" smtClean="0"/>
+              <a:t>2</a:t>
             </a:fld>
             <a:r>
               <a:rPr lang="en-US" altLang="zh-CN"/>
               <a:t>/43</a:t>
             </a:r>
-            <a:endParaRPr lang="en-US" altLang="zh-CN"/>
           </a:p>
         </p:txBody>
       </p:sp>
@@ -5268,8 +5170,8 @@
         </p:nvSpPr>
         <p:spPr>
           <a:xfrm>
-            <a:off x="4824854" y="5764778"/>
-            <a:ext cx="4283968" cy="1039708"/>
+            <a:off x="4860000" y="5760000"/>
+            <a:ext cx="4284000" cy="1044000"/>
           </a:xfrm>
           <a:prstGeom prst="rect">
             <a:avLst/>
@@ -5280,6 +5182,7 @@
           <a:bodyPr wrap="square" rtlCol="0">
             <a:spAutoFit/>
           </a:bodyPr>
+          <a:lstStyle/>
           <a:p>
             <a:pPr algn="l">
               <a:lnSpc>
@@ -5290,15 +5193,15 @@
               </a:spcBef>
             </a:pPr>
             <a:r>
-              <a:rPr lang="en-US" altLang="zh-CN" sz="1800" dirty="0" smtClean="0">
+              <a:rPr lang="en-US" altLang="zh-CN" sz="1800" dirty="0">
                 <a:solidFill>
                   <a:schemeClr val="tx1"/>
                 </a:solidFill>
               </a:rPr>
-              <a:t>70%</a:t>
-            </a:r>
-            <a:r>
-              <a:rPr lang="zh-CN" altLang="en-US" sz="1800" dirty="0" smtClean="0">
+              <a:t>62%</a:t>
+            </a:r>
+            <a:r>
+              <a:rPr lang="zh-CN" altLang="en-US" sz="1800" dirty="0">
                 <a:solidFill>
                   <a:schemeClr val="tx1"/>
                 </a:solidFill>
@@ -5306,7 +5209,7 @@
               <a:t>时间巡天，</a:t>
             </a:r>
             <a:r>
-              <a:rPr lang="en-US" altLang="zh-CN" sz="1800" dirty="0" smtClean="0">
+              <a:rPr lang="en-US" altLang="zh-CN" sz="1800" dirty="0">
                 <a:solidFill>
                   <a:schemeClr val="tx1"/>
                 </a:solidFill>
@@ -5314,7 +5217,7 @@
               <a:t>10%</a:t>
             </a:r>
             <a:r>
-              <a:rPr lang="zh-CN" altLang="en-US" sz="1800" dirty="0" smtClean="0">
+              <a:rPr lang="zh-CN" altLang="en-US" sz="1800" dirty="0">
                 <a:solidFill>
                   <a:schemeClr val="tx1"/>
                 </a:solidFill>
@@ -5322,15 +5225,15 @@
               <a:t>停靠，</a:t>
             </a:r>
             <a:r>
-              <a:rPr lang="en-US" altLang="zh-CN" sz="1800" dirty="0" smtClean="0">
+              <a:rPr lang="en-US" altLang="zh-CN" sz="1800" dirty="0">
                 <a:solidFill>
                   <a:schemeClr val="tx1"/>
                 </a:solidFill>
               </a:rPr>
-              <a:t>20%</a:t>
-            </a:r>
-            <a:r>
-              <a:rPr lang="zh-CN" altLang="en-US" sz="1800" dirty="0" smtClean="0">
+              <a:t>28%</a:t>
+            </a:r>
+            <a:r>
+              <a:rPr lang="zh-CN" altLang="en-US" sz="1800" dirty="0">
                 <a:solidFill>
                   <a:schemeClr val="tx1"/>
                 </a:solidFill>
@@ -5338,7 +5241,7 @@
               <a:t>其它天文仪器。运行条件</a:t>
             </a:r>
             <a:r>
-              <a:rPr lang="en-US" altLang="zh-CN" sz="1800" dirty="0" smtClean="0">
+              <a:rPr lang="en-US" altLang="zh-CN" sz="1800" dirty="0">
                 <a:solidFill>
                   <a:schemeClr val="tx1"/>
                 </a:solidFill>
@@ -5346,18 +5249,13 @@
               <a:t>/</a:t>
             </a:r>
             <a:r>
-              <a:rPr lang="zh-CN" altLang="en-US" sz="1800" dirty="0" smtClean="0">
+              <a:rPr lang="zh-CN" altLang="en-US" sz="1800" dirty="0">
                 <a:solidFill>
                   <a:schemeClr val="tx1"/>
                 </a:solidFill>
               </a:rPr>
               <a:t>限制尚不完备，待研究透彻。有望完成部分黄道、银盘天区。</a:t>
             </a:r>
-            <a:endParaRPr lang="zh-CN" altLang="en-US" sz="1800" dirty="0" smtClean="0">
-              <a:solidFill>
-                <a:schemeClr val="tx1"/>
-              </a:solidFill>
-            </a:endParaRPr>
           </a:p>
         </p:txBody>
       </p:sp>
@@ -5434,7 +5332,7 @@
               <a:defRPr/>
             </a:pPr>
             <a:r>
-              <a:rPr smtClean="0">
+              <a:rPr>
                 <a:sym typeface="Arial" panose="02080604020202020204" pitchFamily="34" charset="0"/>
               </a:rPr>
               <a:t>运行仿真结果</a:t>
@@ -5453,8 +5351,8 @@
         </p:nvSpPr>
         <p:spPr>
           <a:xfrm>
-            <a:off x="103505" y="4839335"/>
-            <a:ext cx="4773295" cy="1745615"/>
+            <a:off x="468000" y="5400000"/>
+            <a:ext cx="4320000" cy="1092607"/>
           </a:xfrm>
           <a:prstGeom prst="rect">
             <a:avLst/>
@@ -5467,72 +5365,20 @@
           </a:bodyPr>
           <a:lstStyle/>
           <a:p>
-            <a:pPr algn="just">
+            <a:pPr>
               <a:spcBef>
                 <a:spcPts val="300"/>
               </a:spcBef>
             </a:pPr>
             <a:r>
-              <a:rPr lang="en-US" altLang="zh-CN" dirty="0">
-                <a:solidFill>
-                  <a:schemeClr val="tx1"/>
+              <a:rPr lang="zh-CN" altLang="en-US" dirty="0">
+                <a:solidFill>
+                  <a:srgbClr val="0070C0"/>
                 </a:solidFill>
                 <a:latin typeface="+mn-lt"/>
                 <a:ea typeface="黑体" pitchFamily="49" charset="-122"/>
               </a:rPr>
-              <a:t>Th</a:t>
-            </a:r>
-            <a:r>
-              <a:rPr lang="en-US" altLang="zh-CN" dirty="0">
-                <a:solidFill>
-                  <a:schemeClr val="tx1"/>
-                </a:solidFill>
-                <a:latin typeface="+mn-lt"/>
-              </a:rPr>
-              <a:t>e Galactic plane &amp; ecliptic plane can be observed!</a:t>
-            </a:r>
-            <a:endParaRPr lang="en-US" altLang="zh-CN" dirty="0">
-              <a:solidFill>
-                <a:schemeClr val="tx1"/>
-              </a:solidFill>
-              <a:latin typeface="+mn-lt"/>
-            </a:endParaRPr>
-          </a:p>
-          <a:p>
-            <a:pPr algn="just">
-              <a:spcBef>
-                <a:spcPts val="300"/>
-              </a:spcBef>
-            </a:pPr>
-            <a:r>
-              <a:rPr lang="en-US" altLang="zh-CN" dirty="0">
-                <a:solidFill>
-                  <a:srgbClr val="0070C0"/>
-                </a:solidFill>
-                <a:latin typeface="+mn-lt"/>
-                <a:ea typeface="黑体" pitchFamily="49" charset="-122"/>
-              </a:rPr>
-              <a:t>Wide-Field: </a:t>
-            </a:r>
-            <a:r>
-              <a:rPr lang="en-US" altLang="en-US" dirty="0">
-                <a:solidFill>
-                  <a:srgbClr val="0070C0"/>
-                </a:solidFill>
-                <a:latin typeface="+mn-lt"/>
-                <a:ea typeface="黑体" pitchFamily="49" charset="-122"/>
-              </a:rPr>
-              <a:t>21988</a:t>
-            </a:r>
-            <a:r>
-              <a:rPr lang="en-US" altLang="zh-CN" dirty="0">
-                <a:solidFill>
-                  <a:srgbClr val="0070C0"/>
-                </a:solidFill>
-                <a:latin typeface="+mn-lt"/>
-                <a:ea typeface="黑体" pitchFamily="49" charset="-122"/>
-              </a:rPr>
-              <a:t> deg^2</a:t>
+              <a:t>新方案</a:t>
             </a:r>
             <a:endParaRPr lang="en-US" altLang="zh-CN" dirty="0">
               <a:solidFill>
@@ -5543,19 +5389,40 @@
             </a:endParaRPr>
           </a:p>
           <a:p>
-            <a:pPr algn="just">
+            <a:pPr>
               <a:spcBef>
                 <a:spcPts val="300"/>
               </a:spcBef>
             </a:pPr>
             <a:r>
+              <a:rPr lang="zh-CN" altLang="en-US" dirty="0">
+                <a:solidFill>
+                  <a:srgbClr val="0070C0"/>
+                </a:solidFill>
+                <a:latin typeface="+mn-lt"/>
+                <a:ea typeface="黑体" pitchFamily="49" charset="-122"/>
+              </a:rPr>
+              <a:t>深度多色成像</a:t>
+            </a:r>
+            <a:r>
               <a:rPr lang="en-US" altLang="zh-CN" dirty="0">
                 <a:solidFill>
                   <a:srgbClr val="0070C0"/>
                 </a:solidFill>
                 <a:latin typeface="+mn-lt"/>
-              </a:rPr>
-              <a:t>Ultra-Deep: 40</a:t>
+                <a:ea typeface="黑体" pitchFamily="49" charset="-122"/>
+              </a:rPr>
+              <a:t> </a:t>
+            </a:r>
+            <a:r>
+              <a:rPr lang="zh-CN" altLang="en-US" dirty="0">
+                <a:solidFill>
+                  <a:srgbClr val="0070C0"/>
+                </a:solidFill>
+                <a:latin typeface="+mn-lt"/>
+                <a:ea typeface="黑体" pitchFamily="49" charset="-122"/>
+              </a:rPr>
+              <a:t>      </a:t>
             </a:r>
             <a:r>
               <a:rPr lang="en-US" altLang="en-US" dirty="0">
@@ -5563,8 +5430,9 @@
                   <a:srgbClr val="0070C0"/>
                 </a:solidFill>
                 <a:latin typeface="+mn-lt"/>
-              </a:rPr>
-              <a:t>7    </a:t>
+                <a:ea typeface="黑体" pitchFamily="49" charset="-122"/>
+              </a:rPr>
+              <a:t>21988</a:t>
             </a:r>
             <a:r>
               <a:rPr lang="en-US" altLang="zh-CN" dirty="0">
@@ -5572,31 +5440,68 @@
                   <a:srgbClr val="0070C0"/>
                 </a:solidFill>
                 <a:latin typeface="+mn-lt"/>
-              </a:rPr>
-              <a:t>deg^2</a:t>
+                <a:ea typeface="黑体" pitchFamily="49" charset="-122"/>
+              </a:rPr>
+              <a:t> </a:t>
+            </a:r>
+            <a:r>
+              <a:rPr lang="zh-CN" altLang="en-US" dirty="0">
+                <a:solidFill>
+                  <a:srgbClr val="0070C0"/>
+                </a:solidFill>
+                <a:latin typeface="+mn-lt"/>
+              </a:rPr>
+              <a:t>平方度</a:t>
             </a:r>
             <a:endParaRPr lang="en-US" altLang="zh-CN" dirty="0">
               <a:solidFill>
                 <a:srgbClr val="0070C0"/>
               </a:solidFill>
               <a:latin typeface="+mn-lt"/>
+              <a:ea typeface="黑体" pitchFamily="49" charset="-122"/>
             </a:endParaRPr>
           </a:p>
           <a:p>
-            <a:pPr algn="just">
+            <a:pPr>
               <a:spcBef>
                 <a:spcPts val="300"/>
               </a:spcBef>
             </a:pPr>
             <a:r>
+              <a:rPr lang="zh-CN" altLang="en-US" dirty="0">
+                <a:solidFill>
+                  <a:srgbClr val="0070C0"/>
+                </a:solidFill>
+                <a:latin typeface="+mn-lt"/>
+              </a:rPr>
+              <a:t>极深度多色成像</a:t>
+            </a:r>
+            <a:r>
               <a:rPr lang="en-US" altLang="zh-CN" dirty="0">
                 <a:solidFill>
                   <a:srgbClr val="0070C0"/>
                 </a:solidFill>
                 <a:latin typeface="+mn-lt"/>
-                <a:sym typeface="+mn-ea"/>
-              </a:rPr>
-              <a:t>obs-time ~ </a:t>
+              </a:rPr>
+              <a:t> </a:t>
+            </a:r>
+            <a:r>
+              <a:rPr lang="zh-CN" altLang="en-US" dirty="0">
+                <a:solidFill>
+                  <a:srgbClr val="0070C0"/>
+                </a:solidFill>
+                <a:latin typeface="+mn-lt"/>
+              </a:rPr>
+              <a:t>      </a:t>
+            </a:r>
+            <a:r>
+              <a:rPr lang="en-US" altLang="zh-CN" dirty="0">
+                <a:solidFill>
+                  <a:srgbClr val="0070C0"/>
+                </a:solidFill>
+                <a:latin typeface="+mn-lt"/>
+              </a:rPr>
+              <a:t>40</a:t>
             </a:r>
             <a:r>
               <a:rPr lang="en-US" altLang="en-US" dirty="0">
@@ -5604,25 +5509,30 @@
                   <a:srgbClr val="0070C0"/>
                 </a:solidFill>
                 <a:latin typeface="+mn-lt"/>
-                <a:sym typeface="+mn-ea"/>
-              </a:rPr>
-              <a:t>70</a:t>
-            </a:r>
-            <a:r>
-              <a:rPr lang="en-US" altLang="zh-CN" dirty="0">
+              </a:rPr>
+              <a:t>7</a:t>
+            </a:r>
+            <a:r>
+              <a:rPr lang="zh-CN" altLang="en-US" dirty="0">
                 <a:solidFill>
                   <a:srgbClr val="0070C0"/>
                 </a:solidFill>
                 <a:latin typeface="+mn-lt"/>
-                <a:sym typeface="+mn-ea"/>
-              </a:rPr>
-              <a:t>%</a:t>
-            </a:r>
-            <a:endParaRPr lang="zh-CN" altLang="en-US" dirty="0">
+              </a:rPr>
+              <a:t> </a:t>
+            </a:r>
+            <a:r>
+              <a:rPr lang="zh-CN" altLang="en-US" dirty="0">
+                <a:solidFill>
+                  <a:srgbClr val="0070C0"/>
+                </a:solidFill>
+              </a:rPr>
+              <a:t>平方度</a:t>
+            </a:r>
+            <a:endParaRPr lang="en-US" altLang="zh-CN" dirty="0">
               <a:solidFill>
                 <a:srgbClr val="0070C0"/>
               </a:solidFill>
-              <a:latin typeface="+mn-lt"/>
             </a:endParaRPr>
           </a:p>
         </p:txBody>
@@ -5636,7 +5546,7 @@
           <p:nvPr/>
         </p:nvPicPr>
         <p:blipFill>
-          <a:blip r:embed="rId1"/>
+          <a:blip r:embed="rId2"/>
           <a:srcRect/>
           <a:stretch>
             <a:fillRect/>
@@ -5644,8 +5554,8 @@
         </p:blipFill>
         <p:spPr>
           <a:xfrm>
-            <a:off x="681355" y="1043940"/>
-            <a:ext cx="3617595" cy="2713355"/>
+            <a:off x="270000" y="1440000"/>
+            <a:ext cx="4680000" cy="3510205"/>
           </a:xfrm>
           <a:prstGeom prst="rect">
             <a:avLst/>
@@ -5659,7 +5569,7 @@
           <p:nvPr/>
         </p:nvPicPr>
         <p:blipFill>
-          <a:blip r:embed="rId2"/>
+          <a:blip r:embed="rId3"/>
           <a:srcRect/>
           <a:stretch>
             <a:fillRect/>
@@ -5667,8 +5577,8 @@
         </p:blipFill>
         <p:spPr bwMode="auto">
           <a:xfrm>
-            <a:off x="4876831" y="1169473"/>
-            <a:ext cx="3959860" cy="5279390"/>
+            <a:off x="5220000" y="900000"/>
+            <a:ext cx="3600000" cy="4860000"/>
           </a:xfrm>
           <a:prstGeom prst="rect">
             <a:avLst/>
@@ -5702,12 +5612,115 @@
             </a:pPr>
             <a:fld id="{9FAFF1DE-EEE8-437C-A843-E0D864A24C4A}" type="slidenum">
               <a:rPr lang="en-US" altLang="zh-CN" smtClean="0"/>
+              <a:t>3</a:t>
             </a:fld>
             <a:r>
               <a:rPr lang="en-US" altLang="zh-CN"/>
               <a:t>/43</a:t>
             </a:r>
-            <a:endParaRPr lang="en-US" altLang="zh-CN"/>
+          </a:p>
+        </p:txBody>
+      </p:sp>
+      <p:sp>
+        <p:nvSpPr>
+          <p:cNvPr id="9" name="TextBox 8">
+            <a:extLst>
+              <a:ext uri="{FF2B5EF4-FFF2-40B4-BE49-F238E27FC236}">
+                <a16:creationId xmlns:a16="http://schemas.microsoft.com/office/drawing/2014/main" id="{557F0CD1-3BF7-504A-B749-938E5B902F53}"/>
+              </a:ext>
+            </a:extLst>
+          </p:cNvPr>
+          <p:cNvSpPr txBox="1"/>
+          <p:nvPr/>
+        </p:nvSpPr>
+        <p:spPr>
+          <a:xfrm>
+            <a:off x="4860000" y="5760000"/>
+            <a:ext cx="4284000" cy="1044000"/>
+          </a:xfrm>
+          <a:prstGeom prst="rect">
+            <a:avLst/>
+          </a:prstGeom>
+          <a:noFill/>
+        </p:spPr>
+        <p:txBody>
+          <a:bodyPr wrap="square" rtlCol="0">
+            <a:spAutoFit/>
+          </a:bodyPr>
+          <a:lstStyle/>
+          <a:p>
+            <a:pPr algn="l">
+              <a:lnSpc>
+                <a:spcPct val="114000"/>
+              </a:lnSpc>
+              <a:spcBef>
+                <a:spcPts val="300"/>
+              </a:spcBef>
+            </a:pPr>
+            <a:r>
+              <a:rPr lang="en-US" altLang="zh-CN" sz="1800" dirty="0">
+                <a:solidFill>
+                  <a:schemeClr val="tx1"/>
+                </a:solidFill>
+              </a:rPr>
+              <a:t>70%</a:t>
+            </a:r>
+            <a:r>
+              <a:rPr lang="zh-CN" altLang="en-US" sz="1800" dirty="0">
+                <a:solidFill>
+                  <a:schemeClr val="tx1"/>
+                </a:solidFill>
+              </a:rPr>
+              <a:t>时间巡天，</a:t>
+            </a:r>
+            <a:r>
+              <a:rPr lang="en-US" altLang="zh-CN" sz="1800" dirty="0">
+                <a:solidFill>
+                  <a:schemeClr val="tx1"/>
+                </a:solidFill>
+              </a:rPr>
+              <a:t>10%</a:t>
+            </a:r>
+            <a:r>
+              <a:rPr lang="zh-CN" altLang="en-US" sz="1800" dirty="0">
+                <a:solidFill>
+                  <a:schemeClr val="tx1"/>
+                </a:solidFill>
+              </a:rPr>
+              <a:t>停靠，</a:t>
+            </a:r>
+            <a:r>
+              <a:rPr lang="en-US" altLang="zh-CN" sz="1800" dirty="0">
+                <a:solidFill>
+                  <a:schemeClr val="tx1"/>
+                </a:solidFill>
+              </a:rPr>
+              <a:t>20%</a:t>
+            </a:r>
+            <a:r>
+              <a:rPr lang="zh-CN" altLang="en-US" sz="1800" dirty="0">
+                <a:solidFill>
+                  <a:schemeClr val="tx1"/>
+                </a:solidFill>
+              </a:rPr>
+              <a:t>其它天文仪器。运行条件</a:t>
+            </a:r>
+            <a:r>
+              <a:rPr lang="en-US" altLang="zh-CN" sz="1800" dirty="0">
+                <a:solidFill>
+                  <a:schemeClr val="tx1"/>
+                </a:solidFill>
+              </a:rPr>
+              <a:t>/</a:t>
+            </a:r>
+            <a:r>
+              <a:rPr lang="zh-CN" altLang="en-US" sz="1800" dirty="0">
+                <a:solidFill>
+                  <a:schemeClr val="tx1"/>
+                </a:solidFill>
+              </a:rPr>
+              <a:t>限制尚不完备，待研究透彻。有望完成部分黄道、银盘天区。</a:t>
+            </a:r>
           </a:p>
         </p:txBody>
       </p:sp>
@@ -5784,7 +5797,7 @@
               <a:defRPr/>
             </a:pPr>
             <a:r>
-              <a:rPr smtClean="0">
+              <a:rPr>
                 <a:sym typeface="Arial" panose="02080604020202020204" pitchFamily="34" charset="0"/>
               </a:rPr>
               <a:t>运行仿真结果</a:t>
@@ -5795,186 +5808,30 @@
           </a:p>
         </p:txBody>
       </p:sp>
-      <p:sp>
-        <p:nvSpPr>
-          <p:cNvPr id="4" name="TextBox 3"/>
-          <p:cNvSpPr txBox="1"/>
-          <p:nvPr/>
-        </p:nvSpPr>
-        <p:spPr>
-          <a:xfrm>
-            <a:off x="103505" y="4839335"/>
-            <a:ext cx="4773295" cy="1745615"/>
-          </a:xfrm>
-          <a:prstGeom prst="rect">
-            <a:avLst/>
-          </a:prstGeom>
-          <a:noFill/>
-        </p:spPr>
-        <p:txBody>
-          <a:bodyPr wrap="square" rtlCol="0">
-            <a:spAutoFit/>
-          </a:bodyPr>
-          <a:lstStyle/>
-          <a:p>
-            <a:pPr algn="just">
-              <a:spcBef>
-                <a:spcPts val="300"/>
-              </a:spcBef>
-            </a:pPr>
-            <a:r>
-              <a:rPr lang="en-US" altLang="zh-CN" dirty="0">
-                <a:solidFill>
-                  <a:schemeClr val="tx1"/>
-                </a:solidFill>
-                <a:latin typeface="+mn-lt"/>
-                <a:ea typeface="黑体" pitchFamily="49" charset="-122"/>
-              </a:rPr>
-              <a:t>Th</a:t>
-            </a:r>
-            <a:r>
-              <a:rPr lang="en-US" altLang="zh-CN" dirty="0">
-                <a:solidFill>
-                  <a:schemeClr val="tx1"/>
-                </a:solidFill>
-                <a:latin typeface="+mn-lt"/>
-              </a:rPr>
-              <a:t>e Galactic plane &amp; ecliptic plane can be observed!</a:t>
-            </a:r>
-            <a:endParaRPr lang="en-US" altLang="zh-CN" dirty="0">
-              <a:solidFill>
-                <a:schemeClr val="tx1"/>
-              </a:solidFill>
-              <a:latin typeface="+mn-lt"/>
-            </a:endParaRPr>
-          </a:p>
-          <a:p>
-            <a:pPr algn="just">
-              <a:spcBef>
-                <a:spcPts val="300"/>
-              </a:spcBef>
-            </a:pPr>
-            <a:r>
-              <a:rPr lang="en-US" altLang="zh-CN" dirty="0">
-                <a:solidFill>
-                  <a:srgbClr val="0070C0"/>
-                </a:solidFill>
-                <a:latin typeface="+mn-lt"/>
-                <a:ea typeface="黑体" pitchFamily="49" charset="-122"/>
-              </a:rPr>
-              <a:t>Wide-Field: </a:t>
-            </a:r>
-            <a:r>
-              <a:rPr lang="en-US" altLang="en-US" dirty="0">
-                <a:solidFill>
-                  <a:srgbClr val="0070C0"/>
-                </a:solidFill>
-                <a:latin typeface="+mn-lt"/>
-                <a:ea typeface="黑体" pitchFamily="49" charset="-122"/>
-              </a:rPr>
-              <a:t>16643</a:t>
-            </a:r>
-            <a:r>
-              <a:rPr lang="en-US" altLang="zh-CN" dirty="0">
-                <a:solidFill>
-                  <a:srgbClr val="0070C0"/>
-                </a:solidFill>
-                <a:latin typeface="+mn-lt"/>
-                <a:ea typeface="黑体" pitchFamily="49" charset="-122"/>
-              </a:rPr>
-              <a:t> deg^2</a:t>
-            </a:r>
-            <a:endParaRPr lang="en-US" altLang="zh-CN" dirty="0">
-              <a:solidFill>
-                <a:srgbClr val="0070C0"/>
-              </a:solidFill>
-              <a:latin typeface="+mn-lt"/>
-              <a:ea typeface="黑体" pitchFamily="49" charset="-122"/>
-            </a:endParaRPr>
-          </a:p>
-          <a:p>
-            <a:pPr algn="just">
-              <a:spcBef>
-                <a:spcPts val="300"/>
-              </a:spcBef>
-            </a:pPr>
-            <a:r>
-              <a:rPr lang="en-US" altLang="zh-CN" dirty="0">
-                <a:solidFill>
-                  <a:srgbClr val="0070C0"/>
-                </a:solidFill>
-                <a:latin typeface="+mn-lt"/>
-              </a:rPr>
-              <a:t>Ultra-Deep: </a:t>
-            </a:r>
-            <a:r>
-              <a:rPr lang="en-US" altLang="en-US" dirty="0">
-                <a:solidFill>
-                  <a:srgbClr val="0070C0"/>
-                </a:solidFill>
-                <a:latin typeface="+mn-lt"/>
-              </a:rPr>
-              <a:t>291    </a:t>
-            </a:r>
-            <a:r>
-              <a:rPr lang="en-US" altLang="zh-CN" dirty="0">
-                <a:solidFill>
-                  <a:srgbClr val="0070C0"/>
-                </a:solidFill>
-                <a:latin typeface="+mn-lt"/>
-              </a:rPr>
-              <a:t>deg^2</a:t>
-            </a:r>
-            <a:endParaRPr lang="en-US" altLang="zh-CN" dirty="0">
-              <a:solidFill>
-                <a:srgbClr val="0070C0"/>
-              </a:solidFill>
-              <a:latin typeface="+mn-lt"/>
-            </a:endParaRPr>
-          </a:p>
-          <a:p>
-            <a:pPr algn="just">
-              <a:spcBef>
-                <a:spcPts val="300"/>
-              </a:spcBef>
-            </a:pPr>
-            <a:r>
-              <a:rPr lang="en-US" altLang="zh-CN" dirty="0">
-                <a:solidFill>
-                  <a:srgbClr val="0070C0"/>
-                </a:solidFill>
-                <a:latin typeface="+mn-lt"/>
-              </a:rPr>
-              <a:t>故障模式</a:t>
-            </a:r>
-            <a:endParaRPr lang="en-US" altLang="zh-CN" dirty="0">
-              <a:solidFill>
-                <a:srgbClr val="0070C0"/>
-              </a:solidFill>
-              <a:latin typeface="+mn-lt"/>
-            </a:endParaRPr>
-          </a:p>
-        </p:txBody>
-      </p:sp>
       <p:pic>
         <p:nvPicPr>
-          <p:cNvPr id="5" name="Content Placeholder 7" descr="/home/xyh/WorkSpace/MyPapers/SurveySim-doc/PPT/20181107/error_mode/beta15/png_E20_b18_gal_center_continous_7yr_beta_15_cmg_err_mode_C.gifpng_E20_b18_gal_center_continous_7yr_beta_15_cmg_err_mode_C"/>
+          <p:cNvPr id="5" name="Content Placeholder 7"/>
           <p:cNvPicPr>
             <a:picLocks noChangeAspect="1"/>
           </p:cNvPicPr>
           <p:nvPr/>
         </p:nvPicPr>
         <p:blipFill>
-          <a:blip r:embed="rId1"/>
-          <a:srcRect/>
+          <a:blip r:embed="rId2">
+            <a:extLst>
+              <a:ext uri="{28A0092B-C50C-407E-A947-70E740481C1C}">
+                <a14:useLocalDpi xmlns:a14="http://schemas.microsoft.com/office/drawing/2010/main" val="0"/>
+              </a:ext>
+            </a:extLst>
+          </a:blip>
           <a:stretch>
             <a:fillRect/>
           </a:stretch>
         </p:blipFill>
         <p:spPr>
           <a:xfrm>
-            <a:off x="36513" y="1301750"/>
-            <a:ext cx="4839970" cy="3630295"/>
+            <a:off x="1468708" y="966089"/>
+            <a:ext cx="2902448" cy="5390262"/>
           </a:xfrm>
           <a:prstGeom prst="rect">
             <a:avLst/>
@@ -5983,12 +5840,12 @@
       </p:pic>
       <p:pic>
         <p:nvPicPr>
-          <p:cNvPr id="8" name="图片 1" descr="/home/xyh/WorkSpace/MyPapers/SurveySim-doc/PPT/20181107/error_mode/beta15/E20_b18_gal_center_continous_7yr_beta_15_cmg_err_mode.pngE20_b18_gal_center_continous_7yr_beta_15_cmg_err_mode"/>
+          <p:cNvPr id="8" name="图片 1" descr="/home/xyh/WorkSpace/MyPapers/SurveySim-doc/PPT/20181107/normal_mode/beta10.8/E16_b16_gal_center_continous_7yr_beta_10.8_no_dark_check.pngE16_b16_gal_center_continous_7yr_beta_10.8_no_dark_check"/>
           <p:cNvPicPr/>
           <p:nvPr/>
         </p:nvPicPr>
         <p:blipFill>
-          <a:blip r:embed="rId2"/>
+          <a:blip r:embed="rId3"/>
           <a:srcRect/>
           <a:stretch>
             <a:fillRect/>
@@ -5996,8 +5853,8 @@
         </p:blipFill>
         <p:spPr bwMode="auto">
           <a:xfrm>
-            <a:off x="4876514" y="1169790"/>
-            <a:ext cx="3959225" cy="5278755"/>
+            <a:off x="5220000" y="900000"/>
+            <a:ext cx="3600000" cy="4860000"/>
           </a:xfrm>
           <a:prstGeom prst="rect">
             <a:avLst/>
@@ -6031,16 +5888,488 @@
             </a:pPr>
             <a:fld id="{9FAFF1DE-EEE8-437C-A843-E0D864A24C4A}" type="slidenum">
               <a:rPr lang="en-US" altLang="zh-CN" smtClean="0"/>
+              <a:t>4</a:t>
             </a:fld>
             <a:r>
               <a:rPr lang="en-US" altLang="zh-CN"/>
               <a:t>/43</a:t>
             </a:r>
-            <a:endParaRPr lang="en-US" altLang="zh-CN"/>
+          </a:p>
+        </p:txBody>
+      </p:sp>
+      <p:sp>
+        <p:nvSpPr>
+          <p:cNvPr id="9" name="TextBox 8">
+            <a:extLst>
+              <a:ext uri="{FF2B5EF4-FFF2-40B4-BE49-F238E27FC236}">
+                <a16:creationId xmlns:a16="http://schemas.microsoft.com/office/drawing/2014/main" id="{557F0CD1-3BF7-504A-B749-938E5B902F53}"/>
+              </a:ext>
+            </a:extLst>
+          </p:cNvPr>
+          <p:cNvSpPr txBox="1"/>
+          <p:nvPr/>
+        </p:nvSpPr>
+        <p:spPr>
+          <a:xfrm>
+            <a:off x="4860000" y="5760000"/>
+            <a:ext cx="4284000" cy="1044000"/>
+          </a:xfrm>
+          <a:prstGeom prst="rect">
+            <a:avLst/>
+          </a:prstGeom>
+          <a:noFill/>
+        </p:spPr>
+        <p:txBody>
+          <a:bodyPr wrap="square" rtlCol="0">
+            <a:spAutoFit/>
+          </a:bodyPr>
+          <a:lstStyle/>
+          <a:p>
+            <a:pPr algn="l">
+              <a:lnSpc>
+                <a:spcPct val="114000"/>
+              </a:lnSpc>
+              <a:spcBef>
+                <a:spcPts val="300"/>
+              </a:spcBef>
+            </a:pPr>
+            <a:r>
+              <a:rPr lang="en-US" altLang="zh-CN" sz="1800" dirty="0">
+                <a:solidFill>
+                  <a:schemeClr val="tx1"/>
+                </a:solidFill>
+              </a:rPr>
+              <a:t>70%</a:t>
+            </a:r>
+            <a:r>
+              <a:rPr lang="zh-CN" altLang="en-US" sz="1800" dirty="0">
+                <a:solidFill>
+                  <a:schemeClr val="tx1"/>
+                </a:solidFill>
+              </a:rPr>
+              <a:t>时间巡天，</a:t>
+            </a:r>
+            <a:r>
+              <a:rPr lang="en-US" altLang="zh-CN" sz="1800" dirty="0">
+                <a:solidFill>
+                  <a:schemeClr val="tx1"/>
+                </a:solidFill>
+              </a:rPr>
+              <a:t>10%</a:t>
+            </a:r>
+            <a:r>
+              <a:rPr lang="zh-CN" altLang="en-US" sz="1800" dirty="0">
+                <a:solidFill>
+                  <a:schemeClr val="tx1"/>
+                </a:solidFill>
+              </a:rPr>
+              <a:t>停靠，</a:t>
+            </a:r>
+            <a:r>
+              <a:rPr lang="en-US" altLang="zh-CN" sz="1800" dirty="0">
+                <a:solidFill>
+                  <a:schemeClr val="tx1"/>
+                </a:solidFill>
+              </a:rPr>
+              <a:t>20%</a:t>
+            </a:r>
+            <a:r>
+              <a:rPr lang="zh-CN" altLang="en-US" sz="1800" dirty="0">
+                <a:solidFill>
+                  <a:schemeClr val="tx1"/>
+                </a:solidFill>
+              </a:rPr>
+              <a:t>其它天文仪器。运行条件</a:t>
+            </a:r>
+            <a:r>
+              <a:rPr lang="en-US" altLang="zh-CN" sz="1800" dirty="0">
+                <a:solidFill>
+                  <a:schemeClr val="tx1"/>
+                </a:solidFill>
+              </a:rPr>
+              <a:t>/</a:t>
+            </a:r>
+            <a:r>
+              <a:rPr lang="zh-CN" altLang="en-US" sz="1800" dirty="0">
+                <a:solidFill>
+                  <a:schemeClr val="tx1"/>
+                </a:solidFill>
+              </a:rPr>
+              <a:t>限制尚不完备，待研究透彻。有望完成部分黄道、银盘天区。</a:t>
+            </a:r>
+          </a:p>
+        </p:txBody>
+      </p:sp>
+      <p:sp>
+        <p:nvSpPr>
+          <p:cNvPr id="7" name="TextBox 6">
+            <a:extLst>
+              <a:ext uri="{FF2B5EF4-FFF2-40B4-BE49-F238E27FC236}">
+                <a16:creationId xmlns:a16="http://schemas.microsoft.com/office/drawing/2014/main" id="{8398B653-F026-3F4E-B2EF-8C3BAA2D0EBA}"/>
+              </a:ext>
+            </a:extLst>
+          </p:cNvPr>
+          <p:cNvSpPr txBox="1"/>
+          <p:nvPr/>
+        </p:nvSpPr>
+        <p:spPr>
+          <a:xfrm>
+            <a:off x="52704" y="1620721"/>
+            <a:ext cx="1399299" cy="628121"/>
+          </a:xfrm>
+          <a:prstGeom prst="rect">
+            <a:avLst/>
+          </a:prstGeom>
+          <a:noFill/>
+        </p:spPr>
+        <p:txBody>
+          <a:bodyPr wrap="square" rtlCol="0">
+            <a:spAutoFit/>
+          </a:bodyPr>
+          <a:lstStyle/>
+          <a:p>
+            <a:pPr>
+              <a:lnSpc>
+                <a:spcPct val="114000"/>
+              </a:lnSpc>
+              <a:spcBef>
+                <a:spcPts val="300"/>
+              </a:spcBef>
+            </a:pPr>
+            <a:r>
+              <a:rPr lang="zh-CN" altLang="en-US" sz="1600" dirty="0">
+                <a:solidFill>
+                  <a:srgbClr val="FF0000"/>
+                </a:solidFill>
+              </a:rPr>
+              <a:t>任一滤光片覆盖</a:t>
+            </a:r>
+            <a:endParaRPr lang="en-US" sz="1600" dirty="0">
+              <a:solidFill>
+                <a:srgbClr val="FF0000"/>
+              </a:solidFill>
+            </a:endParaRPr>
+          </a:p>
+        </p:txBody>
+      </p:sp>
+      <p:sp>
+        <p:nvSpPr>
+          <p:cNvPr id="10" name="TextBox 9">
+            <a:extLst>
+              <a:ext uri="{FF2B5EF4-FFF2-40B4-BE49-F238E27FC236}">
+                <a16:creationId xmlns:a16="http://schemas.microsoft.com/office/drawing/2014/main" id="{33940ACC-28BE-F94A-9001-B57A7BF704C0}"/>
+              </a:ext>
+            </a:extLst>
+          </p:cNvPr>
+          <p:cNvSpPr txBox="1"/>
+          <p:nvPr/>
+        </p:nvSpPr>
+        <p:spPr>
+          <a:xfrm>
+            <a:off x="-4050" y="3330000"/>
+            <a:ext cx="1439348" cy="628121"/>
+          </a:xfrm>
+          <a:prstGeom prst="rect">
+            <a:avLst/>
+          </a:prstGeom>
+          <a:noFill/>
+        </p:spPr>
+        <p:txBody>
+          <a:bodyPr wrap="square" rtlCol="0">
+            <a:spAutoFit/>
+          </a:bodyPr>
+          <a:lstStyle/>
+          <a:p>
+            <a:pPr>
+              <a:lnSpc>
+                <a:spcPct val="114000"/>
+              </a:lnSpc>
+              <a:spcBef>
+                <a:spcPts val="300"/>
+              </a:spcBef>
+            </a:pPr>
+            <a:r>
+              <a:rPr lang="zh-CN" altLang="en-US" sz="1600" dirty="0">
+                <a:solidFill>
+                  <a:srgbClr val="0000FF"/>
+                </a:solidFill>
+              </a:rPr>
+              <a:t>每种滤光片至少覆盖一次</a:t>
+            </a:r>
+            <a:endParaRPr lang="en-US" sz="1600" dirty="0">
+              <a:solidFill>
+                <a:srgbClr val="0000FF"/>
+              </a:solidFill>
+            </a:endParaRPr>
+          </a:p>
+        </p:txBody>
+      </p:sp>
+      <p:sp>
+        <p:nvSpPr>
+          <p:cNvPr id="11" name="TextBox 10">
+            <a:extLst>
+              <a:ext uri="{FF2B5EF4-FFF2-40B4-BE49-F238E27FC236}">
+                <a16:creationId xmlns:a16="http://schemas.microsoft.com/office/drawing/2014/main" id="{A74AD243-6EC9-BD4C-AC99-B06C3BC964E8}"/>
+              </a:ext>
+            </a:extLst>
+          </p:cNvPr>
+          <p:cNvSpPr txBox="1"/>
+          <p:nvPr/>
+        </p:nvSpPr>
+        <p:spPr>
+          <a:xfrm>
+            <a:off x="4741" y="5039279"/>
+            <a:ext cx="1430557" cy="666593"/>
+          </a:xfrm>
+          <a:prstGeom prst="rect">
+            <a:avLst/>
+          </a:prstGeom>
+          <a:noFill/>
+        </p:spPr>
+        <p:txBody>
+          <a:bodyPr wrap="square" rtlCol="0">
+            <a:spAutoFit/>
+          </a:bodyPr>
+          <a:lstStyle/>
+          <a:p>
+            <a:pPr>
+              <a:lnSpc>
+                <a:spcPct val="114000"/>
+              </a:lnSpc>
+              <a:spcBef>
+                <a:spcPts val="300"/>
+              </a:spcBef>
+            </a:pPr>
+            <a:r>
+              <a:rPr lang="en-US" altLang="zh-CN" sz="1600" dirty="0" err="1">
+                <a:solidFill>
+                  <a:srgbClr val="008000"/>
+                </a:solidFill>
+              </a:rPr>
+              <a:t>ugriz</a:t>
+            </a:r>
+            <a:r>
+              <a:rPr lang="zh-CN" altLang="en-US" sz="1600" dirty="0">
+                <a:solidFill>
+                  <a:srgbClr val="008000"/>
+                </a:solidFill>
+              </a:rPr>
+              <a:t> </a:t>
+            </a:r>
+            <a:r>
+              <a:rPr lang="en-US" altLang="zh-CN" sz="1600" dirty="0">
+                <a:solidFill>
+                  <a:srgbClr val="008000"/>
+                </a:solidFill>
+              </a:rPr>
+              <a:t>2</a:t>
+            </a:r>
+            <a:r>
+              <a:rPr lang="zh-CN" altLang="en-US" sz="1600" dirty="0">
+                <a:solidFill>
+                  <a:srgbClr val="008000"/>
+                </a:solidFill>
+              </a:rPr>
+              <a:t>次</a:t>
+            </a:r>
+            <a:endParaRPr lang="en-US" altLang="zh-CN" sz="1600" dirty="0">
+              <a:solidFill>
+                <a:srgbClr val="008000"/>
+              </a:solidFill>
+            </a:endParaRPr>
+          </a:p>
+          <a:p>
+            <a:pPr>
+              <a:lnSpc>
+                <a:spcPct val="114000"/>
+              </a:lnSpc>
+              <a:spcBef>
+                <a:spcPts val="300"/>
+              </a:spcBef>
+            </a:pPr>
+            <a:r>
+              <a:rPr lang="zh-CN" altLang="en-US" sz="1600" dirty="0">
+                <a:solidFill>
+                  <a:srgbClr val="008000"/>
+                </a:solidFill>
+              </a:rPr>
+              <a:t>其他 </a:t>
+            </a:r>
+            <a:r>
+              <a:rPr lang="en-US" altLang="zh-CN" sz="1600" dirty="0">
+                <a:solidFill>
+                  <a:srgbClr val="008000"/>
+                </a:solidFill>
+              </a:rPr>
+              <a:t>4</a:t>
+            </a:r>
+            <a:r>
+              <a:rPr lang="zh-CN" altLang="en-US" sz="1600" dirty="0">
+                <a:solidFill>
+                  <a:srgbClr val="008000"/>
+                </a:solidFill>
+              </a:rPr>
+              <a:t>次</a:t>
+            </a:r>
+            <a:endParaRPr lang="en-US" sz="1600" dirty="0">
+              <a:solidFill>
+                <a:srgbClr val="008000"/>
+              </a:solidFill>
+            </a:endParaRPr>
+          </a:p>
+        </p:txBody>
+      </p:sp>
+      <p:sp>
+        <p:nvSpPr>
+          <p:cNvPr id="4" name="TextBox 3"/>
+          <p:cNvSpPr txBox="1"/>
+          <p:nvPr/>
+        </p:nvSpPr>
+        <p:spPr>
+          <a:xfrm>
+            <a:off x="1468708" y="6190060"/>
+            <a:ext cx="2902448" cy="623248"/>
+          </a:xfrm>
+          <a:prstGeom prst="rect">
+            <a:avLst/>
+          </a:prstGeom>
+          <a:noFill/>
+        </p:spPr>
+        <p:txBody>
+          <a:bodyPr wrap="square" rtlCol="0">
+            <a:spAutoFit/>
+          </a:bodyPr>
+          <a:lstStyle/>
+          <a:p>
+            <a:pPr algn="just">
+              <a:spcBef>
+                <a:spcPts val="300"/>
+              </a:spcBef>
+            </a:pPr>
+            <a:r>
+              <a:rPr lang="zh-CN" altLang="en-US" sz="1600" dirty="0">
+                <a:solidFill>
+                  <a:srgbClr val="0070C0"/>
+                </a:solidFill>
+                <a:latin typeface="+mn-lt"/>
+                <a:ea typeface="黑体" pitchFamily="49" charset="-122"/>
+              </a:rPr>
+              <a:t>深度多色成像</a:t>
+            </a:r>
+            <a:r>
+              <a:rPr lang="en-US" altLang="zh-CN" sz="1600" dirty="0">
+                <a:solidFill>
+                  <a:srgbClr val="0070C0"/>
+                </a:solidFill>
+                <a:latin typeface="+mn-lt"/>
+                <a:ea typeface="黑体" pitchFamily="49" charset="-122"/>
+              </a:rPr>
+              <a:t> </a:t>
+            </a:r>
+            <a:r>
+              <a:rPr lang="zh-CN" altLang="en-US" sz="1600" dirty="0">
+                <a:solidFill>
+                  <a:srgbClr val="0070C0"/>
+                </a:solidFill>
+                <a:latin typeface="+mn-lt"/>
+                <a:ea typeface="黑体" pitchFamily="49" charset="-122"/>
+              </a:rPr>
+              <a:t>      </a:t>
+            </a:r>
+            <a:r>
+              <a:rPr lang="en-US" altLang="en-US" sz="1600" dirty="0">
+                <a:solidFill>
+                  <a:srgbClr val="0070C0"/>
+                </a:solidFill>
+                <a:latin typeface="+mn-lt"/>
+                <a:ea typeface="黑体" pitchFamily="49" charset="-122"/>
+              </a:rPr>
+              <a:t>21988</a:t>
+            </a:r>
+            <a:r>
+              <a:rPr lang="en-US" altLang="zh-CN" sz="1600" dirty="0">
+                <a:solidFill>
+                  <a:srgbClr val="0070C0"/>
+                </a:solidFill>
+                <a:latin typeface="+mn-lt"/>
+                <a:ea typeface="黑体" pitchFamily="49" charset="-122"/>
+              </a:rPr>
+              <a:t> </a:t>
+            </a:r>
+            <a:r>
+              <a:rPr lang="zh-CN" altLang="en-US" sz="1600" dirty="0">
+                <a:solidFill>
+                  <a:srgbClr val="0070C0"/>
+                </a:solidFill>
+                <a:latin typeface="+mn-lt"/>
+              </a:rPr>
+              <a:t>平方度</a:t>
+            </a:r>
+            <a:endParaRPr lang="en-US" altLang="zh-CN" sz="1600" dirty="0">
+              <a:solidFill>
+                <a:srgbClr val="0070C0"/>
+              </a:solidFill>
+              <a:latin typeface="+mn-lt"/>
+              <a:ea typeface="黑体" pitchFamily="49" charset="-122"/>
+            </a:endParaRPr>
+          </a:p>
+          <a:p>
+            <a:pPr algn="just">
+              <a:spcBef>
+                <a:spcPts val="300"/>
+              </a:spcBef>
+            </a:pPr>
+            <a:r>
+              <a:rPr lang="zh-CN" altLang="en-US" sz="1600" dirty="0">
+                <a:solidFill>
+                  <a:srgbClr val="0070C0"/>
+                </a:solidFill>
+                <a:latin typeface="+mn-lt"/>
+              </a:rPr>
+              <a:t>极深度多色成像      </a:t>
+            </a:r>
+            <a:r>
+              <a:rPr lang="en-US" altLang="zh-CN" sz="1600" dirty="0">
+                <a:solidFill>
+                  <a:srgbClr val="0070C0"/>
+                </a:solidFill>
+                <a:latin typeface="+mn-lt"/>
+              </a:rPr>
+              <a:t>40</a:t>
+            </a:r>
+            <a:r>
+              <a:rPr lang="en-US" altLang="en-US" sz="1600" dirty="0">
+                <a:solidFill>
+                  <a:srgbClr val="0070C0"/>
+                </a:solidFill>
+                <a:latin typeface="+mn-lt"/>
+              </a:rPr>
+              <a:t>7  </a:t>
+            </a:r>
+            <a:r>
+              <a:rPr lang="zh-CN" altLang="en-US" sz="1600" dirty="0">
+                <a:solidFill>
+                  <a:srgbClr val="0070C0"/>
+                </a:solidFill>
+                <a:latin typeface="+mn-lt"/>
+              </a:rPr>
+              <a:t>平方度</a:t>
+            </a:r>
+            <a:endParaRPr lang="en-US" altLang="zh-CN" sz="1600" dirty="0">
+              <a:solidFill>
+                <a:srgbClr val="0070C0"/>
+              </a:solidFill>
+              <a:latin typeface="+mn-lt"/>
+            </a:endParaRPr>
           </a:p>
         </p:txBody>
       </p:sp>
     </p:spTree>
+    <p:extLst>
+      <p:ext uri="{BB962C8B-B14F-4D97-AF65-F5344CB8AC3E}">
+        <p14:creationId xmlns:p14="http://schemas.microsoft.com/office/powerpoint/2010/main" val="2993381196"/>
+      </p:ext>
+    </p:extLst>
   </p:cSld>
   <p:clrMapOvr>
     <a:masterClrMapping/>
@@ -6057,10 +6386,17 @@
         <p:cNvGrpSpPr/>
         <p:nvPr/>
       </p:nvGrpSpPr>
-      <p:grpSpPr/>
-      <p:sp>
-        <p:nvSpPr>
-          <p:cNvPr id="2" name="Title 1"/>
+      <p:grpSpPr>
+        <a:xfrm>
+          <a:off x="0" y="0"/>
+          <a:ext cx="0" cy="0"/>
+          <a:chOff x="0" y="0"/>
+          <a:chExt cx="0" cy="0"/>
+        </a:xfrm>
+      </p:grpSpPr>
+      <p:sp>
+        <p:nvSpPr>
+          <p:cNvPr id="2" name="标题 1"/>
           <p:cNvSpPr>
             <a:spLocks noGrp="1"/>
           </p:cNvSpPr>
@@ -6068,17 +6404,262 @@
             <p:ph type="title"/>
           </p:nvPr>
         </p:nvSpPr>
-        <p:spPr/>
-        <p:txBody>
-          <a:bodyPr/>
-          <a:p>
-            <a:endParaRPr lang="en-US"/>
-          </a:p>
-        </p:txBody>
-      </p:sp>
-      <p:sp>
-        <p:nvSpPr>
-          <p:cNvPr id="3" name="Slide Number Placeholder 2"/>
+        <p:spPr>
+          <a:xfrm>
+            <a:off x="36000" y="324000"/>
+            <a:ext cx="9072000" cy="645160"/>
+          </a:xfrm>
+          <a:noFill/>
+          <a:ln>
+            <a:noFill/>
+          </a:ln>
+          <a:effectLst/>
+        </p:spPr>
+        <p:txBody>
+          <a:bodyPr vert="horz" wrap="square" lIns="91440" tIns="45720" rIns="91440" bIns="45720" numCol="1" rtlCol="0" anchor="t" anchorCtr="0" compatLnSpc="1">
+            <a:spAutoFit/>
+            <a:scene3d>
+              <a:camera prst="orthographicFront"/>
+              <a:lightRig rig="flat" dir="tl">
+                <a:rot lat="0" lon="0" rev="6600000"/>
+              </a:lightRig>
+            </a:scene3d>
+            <a:sp3d extrusionH="25400" contourW="8890">
+              <a:bevelT w="38100" h="31750"/>
+              <a:contourClr>
+                <a:schemeClr val="accent2">
+                  <a:shade val="75000"/>
+                </a:schemeClr>
+              </a:contourClr>
+            </a:sp3d>
+          </a:bodyPr>
+          <a:lstStyle/>
+          <a:p>
+            <a:pPr lvl="0" fontAlgn="base">
+              <a:spcAft>
+                <a:spcPct val="0"/>
+              </a:spcAft>
+              <a:defRPr/>
+            </a:pPr>
+            <a:r>
+              <a:rPr>
+                <a:sym typeface="Arial" panose="02080604020202020204" pitchFamily="34" charset="0"/>
+              </a:rPr>
+              <a:t>运行仿真结果</a:t>
+            </a:r>
+            <a:endParaRPr lang="zh-CN" altLang="en-US" dirty="0">
+              <a:sym typeface="Arial" panose="02080604020202020204" pitchFamily="34" charset="0"/>
+            </a:endParaRPr>
+          </a:p>
+        </p:txBody>
+      </p:sp>
+      <p:sp>
+        <p:nvSpPr>
+          <p:cNvPr id="4" name="TextBox 3"/>
+          <p:cNvSpPr txBox="1"/>
+          <p:nvPr/>
+        </p:nvSpPr>
+        <p:spPr>
+          <a:xfrm>
+            <a:off x="467544" y="5478879"/>
+            <a:ext cx="3719145" cy="1092607"/>
+          </a:xfrm>
+          <a:prstGeom prst="rect">
+            <a:avLst/>
+          </a:prstGeom>
+          <a:noFill/>
+        </p:spPr>
+        <p:txBody>
+          <a:bodyPr wrap="square" rtlCol="0">
+            <a:spAutoFit/>
+          </a:bodyPr>
+          <a:lstStyle/>
+          <a:p>
+            <a:pPr>
+              <a:spcBef>
+                <a:spcPts val="300"/>
+              </a:spcBef>
+            </a:pPr>
+            <a:r>
+              <a:rPr lang="en-US" altLang="zh-CN" i="1" u="sng" dirty="0" err="1">
+                <a:solidFill>
+                  <a:srgbClr val="FF0000"/>
+                </a:solidFill>
+                <a:latin typeface="+mn-lt"/>
+              </a:rPr>
+              <a:t>故障模式</a:t>
+            </a:r>
+            <a:endParaRPr lang="en-US" altLang="zh-CN" i="1" u="sng" dirty="0">
+              <a:solidFill>
+                <a:srgbClr val="FF0000"/>
+              </a:solidFill>
+              <a:latin typeface="+mn-lt"/>
+            </a:endParaRPr>
+          </a:p>
+          <a:p>
+            <a:pPr algn="just">
+              <a:spcBef>
+                <a:spcPts val="300"/>
+              </a:spcBef>
+            </a:pPr>
+            <a:r>
+              <a:rPr lang="zh-CN" altLang="en-US" dirty="0">
+                <a:solidFill>
+                  <a:srgbClr val="0070C0"/>
+                </a:solidFill>
+              </a:rPr>
+              <a:t>深度多色成像</a:t>
+            </a:r>
+            <a:r>
+              <a:rPr lang="en-US" altLang="zh-CN" dirty="0">
+                <a:solidFill>
+                  <a:srgbClr val="0070C0"/>
+                </a:solidFill>
+              </a:rPr>
+              <a:t> </a:t>
+            </a:r>
+            <a:r>
+              <a:rPr lang="zh-CN" altLang="en-US" dirty="0">
+                <a:solidFill>
+                  <a:srgbClr val="0070C0"/>
+                </a:solidFill>
+              </a:rPr>
+              <a:t>    </a:t>
+            </a:r>
+            <a:r>
+              <a:rPr lang="en-US" altLang="en-US" dirty="0">
+                <a:solidFill>
+                  <a:srgbClr val="0070C0"/>
+                </a:solidFill>
+              </a:rPr>
+              <a:t>16643</a:t>
+            </a:r>
+            <a:r>
+              <a:rPr lang="en-US" altLang="zh-CN" dirty="0">
+                <a:solidFill>
+                  <a:srgbClr val="0070C0"/>
+                </a:solidFill>
+              </a:rPr>
+              <a:t> </a:t>
+            </a:r>
+            <a:r>
+              <a:rPr lang="zh-CN" altLang="en-US" dirty="0">
+                <a:solidFill>
+                  <a:srgbClr val="0070C0"/>
+                </a:solidFill>
+              </a:rPr>
+              <a:t> 平方度</a:t>
+            </a:r>
+            <a:endParaRPr lang="en-US" altLang="zh-CN" dirty="0">
+              <a:solidFill>
+                <a:srgbClr val="0070C0"/>
+              </a:solidFill>
+            </a:endParaRPr>
+          </a:p>
+          <a:p>
+            <a:pPr algn="just">
+              <a:spcBef>
+                <a:spcPts val="300"/>
+              </a:spcBef>
+            </a:pPr>
+            <a:r>
+              <a:rPr lang="zh-CN" altLang="en-US" dirty="0">
+                <a:solidFill>
+                  <a:srgbClr val="0070C0"/>
+                </a:solidFill>
+              </a:rPr>
+              <a:t>极深度多色成像  </a:t>
+            </a:r>
+            <a:r>
+              <a:rPr lang="en-US" altLang="zh-CN" dirty="0">
+                <a:solidFill>
+                  <a:srgbClr val="0070C0"/>
+                </a:solidFill>
+              </a:rPr>
+              <a:t>291</a:t>
+            </a:r>
+            <a:r>
+              <a:rPr lang="en-US" altLang="en-US" dirty="0">
+                <a:solidFill>
+                  <a:srgbClr val="0070C0"/>
+                </a:solidFill>
+              </a:rPr>
+              <a:t>    </a:t>
+            </a:r>
+            <a:r>
+              <a:rPr lang="zh-CN" altLang="en-US" dirty="0">
+                <a:solidFill>
+                  <a:srgbClr val="0070C0"/>
+                </a:solidFill>
+              </a:rPr>
+              <a:t> 平方度</a:t>
+            </a:r>
+            <a:endParaRPr lang="en-US" altLang="zh-CN" dirty="0">
+              <a:solidFill>
+                <a:srgbClr val="0070C0"/>
+              </a:solidFill>
+            </a:endParaRPr>
+          </a:p>
+        </p:txBody>
+      </p:sp>
+      <p:pic>
+        <p:nvPicPr>
+          <p:cNvPr id="5" name="Content Placeholder 7" descr="/home/xyh/WorkSpace/MyPapers/SurveySim-doc/PPT/20181107/error_mode/beta15/png_E20_b18_gal_center_continous_7yr_beta_15_cmg_err_mode_C.gifpng_E20_b18_gal_center_continous_7yr_beta_15_cmg_err_mode_C"/>
+          <p:cNvPicPr>
+            <a:picLocks noChangeAspect="1"/>
+          </p:cNvPicPr>
+          <p:nvPr/>
+        </p:nvPicPr>
+        <p:blipFill>
+          <a:blip r:embed="rId2"/>
+          <a:srcRect/>
+          <a:stretch>
+            <a:fillRect/>
+          </a:stretch>
+        </p:blipFill>
+        <p:spPr>
+          <a:xfrm>
+            <a:off x="31456" y="1542245"/>
+            <a:ext cx="4839970" cy="3630295"/>
+          </a:xfrm>
+          <a:prstGeom prst="rect">
+            <a:avLst/>
+          </a:prstGeom>
+        </p:spPr>
+      </p:pic>
+      <p:pic>
+        <p:nvPicPr>
+          <p:cNvPr id="8" name="图片 1" descr="/home/xyh/WorkSpace/MyPapers/SurveySim-doc/PPT/20181107/error_mode/beta15/E20_b18_gal_center_continous_7yr_beta_15_cmg_err_mode.pngE20_b18_gal_center_continous_7yr_beta_15_cmg_err_mode"/>
+          <p:cNvPicPr/>
+          <p:nvPr/>
+        </p:nvPicPr>
+        <p:blipFill>
+          <a:blip r:embed="rId3"/>
+          <a:srcRect/>
+          <a:stretch>
+            <a:fillRect/>
+          </a:stretch>
+        </p:blipFill>
+        <p:spPr bwMode="auto">
+          <a:xfrm>
+            <a:off x="5220000" y="900000"/>
+            <a:ext cx="3600000" cy="4860000"/>
+          </a:xfrm>
+          <a:prstGeom prst="rect">
+            <a:avLst/>
+          </a:prstGeom>
+          <a:noFill/>
+          <a:ln w="9525">
+            <a:noFill/>
+            <a:miter lim="800000"/>
+            <a:headEnd/>
+            <a:tailEnd/>
+          </a:ln>
+        </p:spPr>
+      </p:pic>
+      <p:sp>
+        <p:nvSpPr>
+          <p:cNvPr id="6" name="Slide Number Placeholder 5"/>
           <p:cNvSpPr>
             <a:spLocks noGrp="1"/>
           </p:cNvSpPr>
@@ -6089,314 +6670,125 @@
         <p:spPr/>
         <p:txBody>
           <a:bodyPr/>
+          <a:lstStyle/>
           <a:p>
             <a:pPr>
               <a:defRPr/>
             </a:pPr>
             <a:fld id="{9FAFF1DE-EEE8-437C-A843-E0D864A24C4A}" type="slidenum">
               <a:rPr lang="en-US" altLang="zh-CN" smtClean="0"/>
+              <a:t>5</a:t>
             </a:fld>
             <a:r>
               <a:rPr lang="en-US" altLang="zh-CN"/>
               <a:t>/43</a:t>
             </a:r>
-            <a:endParaRPr lang="en-US" altLang="zh-CN"/>
-          </a:p>
-        </p:txBody>
-      </p:sp>
-      <p:graphicFrame>
-        <p:nvGraphicFramePr>
-          <p:cNvPr id="4" name="Table 3"/>
-          <p:cNvGraphicFramePr/>
+          </a:p>
+        </p:txBody>
+      </p:sp>
+      <p:sp>
+        <p:nvSpPr>
+          <p:cNvPr id="7" name="TextBox 6">
+            <a:extLst>
+              <a:ext uri="{FF2B5EF4-FFF2-40B4-BE49-F238E27FC236}">
+                <a16:creationId xmlns:a16="http://schemas.microsoft.com/office/drawing/2014/main" id="{310A0914-C99F-EA4E-8B55-BA1F2BC2AB70}"/>
+              </a:ext>
+            </a:extLst>
+          </p:cNvPr>
+          <p:cNvSpPr txBox="1"/>
           <p:nvPr/>
-        </p:nvGraphicFramePr>
-        <p:xfrm>
-          <a:off x="1214755" y="1914525"/>
-          <a:ext cx="6715760" cy="2796540"/>
-        </p:xfrm>
-        <a:graphic>
-          <a:graphicData uri="http://schemas.openxmlformats.org/drawingml/2006/table">
-            <a:tbl>
-              <a:tblPr firstRow="1" bandRow="1">
-                <a:tableStyleId>{5C22544A-7EE6-4342-B048-85BDC9FD1C3A}</a:tableStyleId>
-              </a:tblPr>
-              <a:tblGrid>
-                <a:gridCol w="1678940"/>
-                <a:gridCol w="1678940"/>
-                <a:gridCol w="1678940"/>
-                <a:gridCol w="1678940"/>
-              </a:tblGrid>
-              <a:tr h="699135">
-                <a:tc>
-                  <a:txBody>
-                    <a:bodyPr/>
-                    <a:p>
-                      <a:pPr algn="ctr">
-                        <a:buNone/>
-                      </a:pPr>
-                      <a:endParaRPr lang="en-US"/>
-                    </a:p>
-                  </a:txBody>
-                  <a:tcPr anchor="ctr" anchorCtr="0"/>
-                </a:tc>
-                <a:tc>
-                  <a:txBody>
-                    <a:bodyPr/>
-                    <a:p>
-                      <a:pPr algn="ctr">
-                        <a:buNone/>
-                      </a:pPr>
-                      <a:r>
-                        <a:rPr lang="" altLang="en-US"/>
-                        <a:t>旧方案</a:t>
-                      </a:r>
-                      <a:endParaRPr lang="" altLang="en-US"/>
-                    </a:p>
-                  </a:txBody>
-                  <a:tcPr anchor="ctr" anchorCtr="0"/>
-                </a:tc>
-                <a:tc gridSpan="2">
-                  <a:txBody>
-                    <a:bodyPr/>
-                    <a:p>
-                      <a:pPr algn="ctr">
-                        <a:buNone/>
-                      </a:pPr>
-                      <a:r>
-                        <a:rPr lang="" altLang="en-US"/>
-                        <a:t>新方案</a:t>
-                      </a:r>
-                      <a:endParaRPr lang="" altLang="en-US"/>
-                    </a:p>
-                  </a:txBody>
-                  <a:tcPr anchor="ctr" anchorCtr="0"/>
-                </a:tc>
-                <a:tc hMerge="1">
-                  <a:tcPr anchor="ctr" anchorCtr="0"/>
-                </a:tc>
-              </a:tr>
-              <a:tr h="699135">
-                <a:tc>
-                  <a:txBody>
-                    <a:bodyPr/>
-                    <a:p>
-                      <a:pPr algn="ctr">
-                        <a:buNone/>
-                      </a:pPr>
-                      <a:endParaRPr lang="en-US"/>
-                    </a:p>
-                  </a:txBody>
-                  <a:tcPr anchor="ctr" anchorCtr="0"/>
-                </a:tc>
-                <a:tc>
-                  <a:txBody>
-                    <a:bodyPr/>
-                    <a:p>
-                      <a:pPr algn="ctr">
-                        <a:buNone/>
-                      </a:pPr>
-                      <a:endParaRPr lang="en-US"/>
-                    </a:p>
-                  </a:txBody>
-                  <a:tcPr anchor="ctr" anchorCtr="0"/>
-                </a:tc>
-                <a:tc>
-                  <a:txBody>
-                    <a:bodyPr/>
-                    <a:p>
-                      <a:pPr algn="ctr">
-                        <a:buNone/>
-                      </a:pPr>
-                      <a:r>
-                        <a:rPr lang="en-US" altLang="en-US"/>
-                        <a:t>正常模式</a:t>
-                      </a:r>
-                      <a:endParaRPr lang="en-US" altLang="en-US"/>
-                    </a:p>
-                  </a:txBody>
-                  <a:tcPr anchor="ctr" anchorCtr="0"/>
-                </a:tc>
-                <a:tc>
-                  <a:txBody>
-                    <a:bodyPr/>
-                    <a:p>
-                      <a:pPr algn="ctr">
-                        <a:buNone/>
-                      </a:pPr>
-                      <a:r>
-                        <a:rPr lang="en-US" altLang="en-US"/>
-                        <a:t>故障模式</a:t>
-                      </a:r>
-                      <a:endParaRPr lang="en-US" altLang="en-US"/>
-                    </a:p>
-                  </a:txBody>
-                  <a:tcPr anchor="ctr" anchorCtr="0"/>
-                </a:tc>
-              </a:tr>
-              <a:tr h="699135">
-                <a:tc>
-                  <a:txBody>
-                    <a:bodyPr/>
-                    <a:p>
-                      <a:pPr algn="ctr">
-                        <a:buNone/>
-                      </a:pPr>
-                      <a:r>
-                        <a:rPr lang="en-US" altLang="en-US"/>
-                        <a:t>62%</a:t>
-                      </a:r>
-                      <a:endParaRPr lang="en-US" altLang="en-US"/>
-                    </a:p>
-                  </a:txBody>
-                  <a:tcPr anchor="ctr" anchorCtr="0"/>
-                </a:tc>
-                <a:tc>
-                  <a:txBody>
-                    <a:bodyPr/>
-                    <a:p>
-                      <a:pPr algn="ctr">
-                        <a:buNone/>
-                      </a:pPr>
-                      <a:endParaRPr lang="en-US" altLang="en-US"/>
-                    </a:p>
-                  </a:txBody>
-                  <a:tcPr anchor="ctr" anchorCtr="0"/>
-                </a:tc>
-                <a:tc>
-                  <a:txBody>
-                    <a:bodyPr/>
-                    <a:p>
-                      <a:pPr algn="ctr">
-                        <a:buNone/>
-                      </a:pPr>
-                      <a:r>
-                        <a:rPr lang="en-US"/>
-                        <a:t>19353</a:t>
-                      </a:r>
-                      <a:r>
-                        <a:rPr lang="en-US" altLang="en-US"/>
-                        <a:t>，</a:t>
-                      </a:r>
-                      <a:r>
-                        <a:rPr lang="en-US"/>
-                        <a:t>3</a:t>
-                      </a:r>
-                      <a:r>
-                        <a:rPr lang="en-US" altLang="en-US"/>
-                        <a:t>80</a:t>
-                      </a:r>
-                      <a:endParaRPr lang="en-US" altLang="en-US"/>
-                    </a:p>
-                  </a:txBody>
-                  <a:tcPr anchor="ctr" anchorCtr="0"/>
-                </a:tc>
-                <a:tc>
-                  <a:txBody>
-                    <a:bodyPr/>
-                    <a:p>
-                      <a:pPr algn="ctr">
-                        <a:buNone/>
-                      </a:pPr>
-                      <a:r>
-                        <a:rPr lang="en-US"/>
-                        <a:t>16643</a:t>
-                      </a:r>
-                      <a:r>
-                        <a:rPr lang="en-US" altLang="en-US"/>
-                        <a:t>，</a:t>
-                      </a:r>
-                      <a:r>
-                        <a:rPr lang="en-US"/>
-                        <a:t>291</a:t>
-                      </a:r>
-                      <a:endParaRPr lang="en-US"/>
-                    </a:p>
-                  </a:txBody>
-                  <a:tcPr anchor="ctr" anchorCtr="0"/>
-                </a:tc>
-              </a:tr>
-              <a:tr h="699135">
-                <a:tc>
-                  <a:txBody>
-                    <a:bodyPr/>
-                    <a:p>
-                      <a:pPr algn="ctr">
-                        <a:buNone/>
-                      </a:pPr>
-                      <a:r>
-                        <a:rPr lang="en-US" altLang="en-US"/>
-                        <a:t>70%</a:t>
-                      </a:r>
-                      <a:endParaRPr lang="en-US" altLang="en-US"/>
-                    </a:p>
-                  </a:txBody>
-                  <a:tcPr anchor="ctr" anchorCtr="0"/>
-                </a:tc>
-                <a:tc>
-                  <a:txBody>
-                    <a:bodyPr/>
-                    <a:p>
-                      <a:pPr algn="ctr">
-                        <a:buNone/>
-                      </a:pPr>
-                      <a:endParaRPr lang="en-US" altLang="en-US"/>
-                    </a:p>
-                  </a:txBody>
-                  <a:tcPr anchor="ctr" anchorCtr="0"/>
-                </a:tc>
-                <a:tc>
-                  <a:txBody>
-                    <a:bodyPr/>
-                    <a:p>
-                      <a:pPr algn="ctr">
-                        <a:buNone/>
-                      </a:pPr>
-                      <a:r>
-                        <a:rPr lang="en-US"/>
-                        <a:t>21988</a:t>
-                      </a:r>
-                      <a:r>
-                        <a:rPr lang="en-US" altLang="en-US"/>
-                        <a:t>，</a:t>
-                      </a:r>
-                      <a:r>
-                        <a:rPr lang="en-US"/>
-                        <a:t>407</a:t>
-                      </a:r>
-                      <a:endParaRPr lang="en-US"/>
-                    </a:p>
-                  </a:txBody>
-                  <a:tcPr anchor="ctr" anchorCtr="0"/>
-                </a:tc>
-                <a:tc>
-                  <a:txBody>
-                    <a:bodyPr/>
-                    <a:p>
-                      <a:pPr algn="ctr">
-                        <a:buNone/>
-                      </a:pPr>
-                      <a:r>
-                        <a:rPr lang="en-US"/>
-                        <a:t>17982</a:t>
-                      </a:r>
-                      <a:r>
-                        <a:rPr lang="en-US" altLang="en-US"/>
-                        <a:t>，</a:t>
-                      </a:r>
-                      <a:r>
-                        <a:rPr lang="en-US"/>
-                        <a:t>391</a:t>
-                      </a:r>
-                      <a:endParaRPr lang="en-US"/>
-                    </a:p>
-                  </a:txBody>
-                  <a:tcPr anchor="ctr" anchorCtr="0"/>
-                </a:tc>
-              </a:tr>
-            </a:tbl>
-          </a:graphicData>
-        </a:graphic>
-      </p:graphicFrame>
+        </p:nvSpPr>
+        <p:spPr>
+          <a:xfrm>
+            <a:off x="4860000" y="5760000"/>
+            <a:ext cx="4284000" cy="1044000"/>
+          </a:xfrm>
+          <a:prstGeom prst="rect">
+            <a:avLst/>
+          </a:prstGeom>
+          <a:noFill/>
+        </p:spPr>
+        <p:txBody>
+          <a:bodyPr wrap="square" rtlCol="0">
+            <a:spAutoFit/>
+          </a:bodyPr>
+          <a:lstStyle/>
+          <a:p>
+            <a:pPr algn="l">
+              <a:lnSpc>
+                <a:spcPct val="114000"/>
+              </a:lnSpc>
+              <a:spcBef>
+                <a:spcPts val="300"/>
+              </a:spcBef>
+            </a:pPr>
+            <a:r>
+              <a:rPr lang="en-US" altLang="zh-CN" sz="1800" dirty="0">
+                <a:solidFill>
+                  <a:schemeClr val="tx1"/>
+                </a:solidFill>
+              </a:rPr>
+              <a:t>62%</a:t>
+            </a:r>
+            <a:r>
+              <a:rPr lang="zh-CN" altLang="en-US" sz="1800" dirty="0">
+                <a:solidFill>
+                  <a:schemeClr val="tx1"/>
+                </a:solidFill>
+              </a:rPr>
+              <a:t>时间巡天，</a:t>
+            </a:r>
+            <a:r>
+              <a:rPr lang="en-US" altLang="zh-CN" sz="1800" dirty="0">
+                <a:solidFill>
+                  <a:schemeClr val="tx1"/>
+                </a:solidFill>
+              </a:rPr>
+              <a:t>10%</a:t>
+            </a:r>
+            <a:r>
+              <a:rPr lang="zh-CN" altLang="en-US" sz="1800" dirty="0">
+                <a:solidFill>
+                  <a:schemeClr val="tx1"/>
+                </a:solidFill>
+              </a:rPr>
+              <a:t>停靠，</a:t>
+            </a:r>
+            <a:r>
+              <a:rPr lang="en-US" altLang="zh-CN" sz="1800" dirty="0">
+                <a:solidFill>
+                  <a:schemeClr val="tx1"/>
+                </a:solidFill>
+              </a:rPr>
+              <a:t>28%</a:t>
+            </a:r>
+            <a:r>
+              <a:rPr lang="zh-CN" altLang="en-US" sz="1800" dirty="0">
+                <a:solidFill>
+                  <a:schemeClr val="tx1"/>
+                </a:solidFill>
+              </a:rPr>
+              <a:t>其它天文仪器。运行条件</a:t>
+            </a:r>
+            <a:r>
+              <a:rPr lang="en-US" altLang="zh-CN" sz="1800" dirty="0">
+                <a:solidFill>
+                  <a:schemeClr val="tx1"/>
+                </a:solidFill>
+              </a:rPr>
+              <a:t>/</a:t>
+            </a:r>
+            <a:r>
+              <a:rPr lang="zh-CN" altLang="en-US" sz="1800" dirty="0">
+                <a:solidFill>
+                  <a:schemeClr val="tx1"/>
+                </a:solidFill>
+              </a:rPr>
+              <a:t>限制尚不完备，待研究透彻。有望完成部分黄道、银盘天区。</a:t>
+            </a:r>
+          </a:p>
+        </p:txBody>
+      </p:sp>
     </p:spTree>
   </p:cSld>
   <p:clrMapOvr>
@@ -6424,6 +6816,877 @@
       </p:grpSpPr>
       <p:sp>
         <p:nvSpPr>
+          <p:cNvPr id="2" name="Title 1"/>
+          <p:cNvSpPr>
+            <a:spLocks noGrp="1"/>
+          </p:cNvSpPr>
+          <p:nvPr>
+            <p:ph type="title"/>
+          </p:nvPr>
+        </p:nvSpPr>
+        <p:spPr/>
+        <p:txBody>
+          <a:bodyPr/>
+          <a:lstStyle/>
+          <a:p>
+            <a:r>
+              <a:rPr lang="zh-CN" altLang="en-US" dirty="0"/>
+              <a:t>新旧方案对比</a:t>
+            </a:r>
+            <a:endParaRPr lang="en-US" dirty="0"/>
+          </a:p>
+        </p:txBody>
+      </p:sp>
+      <p:sp>
+        <p:nvSpPr>
+          <p:cNvPr id="3" name="Slide Number Placeholder 2"/>
+          <p:cNvSpPr>
+            <a:spLocks noGrp="1"/>
+          </p:cNvSpPr>
+          <p:nvPr>
+            <p:ph type="sldNum" sz="quarter" idx="12"/>
+          </p:nvPr>
+        </p:nvSpPr>
+        <p:spPr/>
+        <p:txBody>
+          <a:bodyPr/>
+          <a:lstStyle/>
+          <a:p>
+            <a:pPr>
+              <a:defRPr/>
+            </a:pPr>
+            <a:fld id="{9FAFF1DE-EEE8-437C-A843-E0D864A24C4A}" type="slidenum">
+              <a:rPr lang="en-US" altLang="zh-CN" smtClean="0"/>
+              <a:t>6</a:t>
+            </a:fld>
+            <a:r>
+              <a:rPr lang="en-US" altLang="zh-CN"/>
+              <a:t>/43</a:t>
+            </a:r>
+          </a:p>
+        </p:txBody>
+      </p:sp>
+      <p:graphicFrame>
+        <p:nvGraphicFramePr>
+          <p:cNvPr id="4" name="Table 3"/>
+          <p:cNvGraphicFramePr/>
+          <p:nvPr>
+            <p:extLst>
+              <p:ext uri="{D42A27DB-BD31-4B8C-83A1-F6EECF244321}">
+                <p14:modId xmlns:p14="http://schemas.microsoft.com/office/powerpoint/2010/main" val="404622009"/>
+              </p:ext>
+            </p:extLst>
+          </p:nvPr>
+        </p:nvGraphicFramePr>
+        <p:xfrm>
+          <a:off x="1214755" y="1914525"/>
+          <a:ext cx="6715760" cy="2264673"/>
+        </p:xfrm>
+        <a:graphic>
+          <a:graphicData uri="http://schemas.openxmlformats.org/drawingml/2006/table">
+            <a:tbl>
+              <a:tblPr firstRow="1" bandRow="1">
+                <a:tableStyleId>{5C22544A-7EE6-4342-B048-85BDC9FD1C3A}</a:tableStyleId>
+              </a:tblPr>
+              <a:tblGrid>
+                <a:gridCol w="1678940">
+                  <a:extLst>
+                    <a:ext uri="{9D8B030D-6E8A-4147-A177-3AD203B41FA5}">
+                      <a16:colId xmlns:a16="http://schemas.microsoft.com/office/drawing/2014/main" val="20000"/>
+                    </a:ext>
+                  </a:extLst>
+                </a:gridCol>
+                <a:gridCol w="1678940">
+                  <a:extLst>
+                    <a:ext uri="{9D8B030D-6E8A-4147-A177-3AD203B41FA5}">
+                      <a16:colId xmlns:a16="http://schemas.microsoft.com/office/drawing/2014/main" val="20001"/>
+                    </a:ext>
+                  </a:extLst>
+                </a:gridCol>
+                <a:gridCol w="1678940">
+                  <a:extLst>
+                    <a:ext uri="{9D8B030D-6E8A-4147-A177-3AD203B41FA5}">
+                      <a16:colId xmlns:a16="http://schemas.microsoft.com/office/drawing/2014/main" val="20002"/>
+                    </a:ext>
+                  </a:extLst>
+                </a:gridCol>
+                <a:gridCol w="1678940">
+                  <a:extLst>
+                    <a:ext uri="{9D8B030D-6E8A-4147-A177-3AD203B41FA5}">
+                      <a16:colId xmlns:a16="http://schemas.microsoft.com/office/drawing/2014/main" val="20003"/>
+                    </a:ext>
+                  </a:extLst>
+                </a:gridCol>
+              </a:tblGrid>
+              <a:tr h="866403">
+                <a:tc>
+                  <a:txBody>
+                    <a:bodyPr/>
+                    <a:lstStyle/>
+                    <a:p>
+                      <a:pPr algn="ctr">
+                        <a:buNone/>
+                      </a:pPr>
+                      <a:r>
+                        <a:rPr lang="zh-CN" altLang="en-US" sz="2000" b="1" i="0" dirty="0">
+                          <a:solidFill>
+                            <a:srgbClr val="7030A0"/>
+                          </a:solidFill>
+                          <a:latin typeface="+mn-lt"/>
+                          <a:cs typeface="Calibri" panose="020F0502020204030204" pitchFamily="34" charset="0"/>
+                        </a:rPr>
+                        <a:t>观测时间</a:t>
+                      </a:r>
+                      <a:endParaRPr lang="en-US" altLang="zh-CN" sz="2000" b="1" i="0" dirty="0">
+                        <a:solidFill>
+                          <a:srgbClr val="7030A0"/>
+                        </a:solidFill>
+                        <a:latin typeface="+mn-lt"/>
+                        <a:cs typeface="Calibri" panose="020F0502020204030204" pitchFamily="34" charset="0"/>
+                      </a:endParaRPr>
+                    </a:p>
+                    <a:p>
+                      <a:pPr algn="ctr">
+                        <a:buNone/>
+                      </a:pPr>
+                      <a:r>
+                        <a:rPr lang="zh-CN" altLang="en-US" sz="2000" b="1" i="0" dirty="0">
+                          <a:solidFill>
+                            <a:srgbClr val="7030A0"/>
+                          </a:solidFill>
+                          <a:latin typeface="+mn-lt"/>
+                          <a:cs typeface="Calibri" panose="020F0502020204030204" pitchFamily="34" charset="0"/>
+                        </a:rPr>
+                        <a:t>占比</a:t>
+                      </a:r>
+                      <a:endParaRPr lang="en-US" sz="2000" b="1" i="0" dirty="0">
+                        <a:solidFill>
+                          <a:srgbClr val="7030A0"/>
+                        </a:solidFill>
+                        <a:latin typeface="+mn-lt"/>
+                        <a:cs typeface="Calibri" panose="020F0502020204030204" pitchFamily="34" charset="0"/>
+                      </a:endParaRPr>
+                    </a:p>
+                  </a:txBody>
+                  <a:tcPr anchor="ctr">
+                    <a:gradFill>
+                      <a:gsLst>
+                        <a:gs pos="0">
+                          <a:schemeClr val="accent1">
+                            <a:lumMod val="5000"/>
+                            <a:lumOff val="95000"/>
+                          </a:schemeClr>
+                        </a:gs>
+                        <a:gs pos="74000">
+                          <a:schemeClr val="accent1">
+                            <a:lumMod val="45000"/>
+                            <a:lumOff val="55000"/>
+                          </a:schemeClr>
+                        </a:gs>
+                        <a:gs pos="83000">
+                          <a:schemeClr val="accent1">
+                            <a:lumMod val="45000"/>
+                            <a:lumOff val="55000"/>
+                          </a:schemeClr>
+                        </a:gs>
+                        <a:gs pos="100000">
+                          <a:schemeClr val="accent1">
+                            <a:lumMod val="30000"/>
+                            <a:lumOff val="70000"/>
+                          </a:schemeClr>
+                        </a:gs>
+                      </a:gsLst>
+                      <a:lin ang="5400000" scaled="1"/>
+                    </a:gradFill>
+                  </a:tcPr>
+                </a:tc>
+                <a:tc>
+                  <a:txBody>
+                    <a:bodyPr/>
+                    <a:lstStyle/>
+                    <a:p>
+                      <a:pPr algn="ctr">
+                        <a:buNone/>
+                      </a:pPr>
+                      <a:r>
+                        <a:rPr lang="" altLang="en-US" sz="2000" dirty="0">
+                          <a:solidFill>
+                            <a:schemeClr val="tx1"/>
+                          </a:solidFill>
+                        </a:rPr>
+                        <a:t>旧方案</a:t>
+                      </a:r>
+                    </a:p>
+                  </a:txBody>
+                  <a:tcPr anchor="ctr">
+                    <a:gradFill>
+                      <a:gsLst>
+                        <a:gs pos="0">
+                          <a:schemeClr val="accent1">
+                            <a:lumMod val="5000"/>
+                            <a:lumOff val="95000"/>
+                          </a:schemeClr>
+                        </a:gs>
+                        <a:gs pos="74000">
+                          <a:schemeClr val="accent1">
+                            <a:lumMod val="45000"/>
+                            <a:lumOff val="55000"/>
+                          </a:schemeClr>
+                        </a:gs>
+                        <a:gs pos="83000">
+                          <a:schemeClr val="accent1">
+                            <a:lumMod val="45000"/>
+                            <a:lumOff val="55000"/>
+                          </a:schemeClr>
+                        </a:gs>
+                        <a:gs pos="100000">
+                          <a:schemeClr val="accent1">
+                            <a:lumMod val="30000"/>
+                            <a:lumOff val="70000"/>
+                          </a:schemeClr>
+                        </a:gs>
+                      </a:gsLst>
+                      <a:lin ang="5400000" scaled="1"/>
+                    </a:gradFill>
+                  </a:tcPr>
+                </a:tc>
+                <a:tc gridSpan="2">
+                  <a:txBody>
+                    <a:bodyPr/>
+                    <a:lstStyle/>
+                    <a:p>
+                      <a:pPr algn="ctr">
+                        <a:buNone/>
+                      </a:pPr>
+                      <a:r>
+                        <a:rPr lang="" altLang="en-US" sz="2000" dirty="0">
+                          <a:solidFill>
+                            <a:schemeClr val="tx1"/>
+                          </a:solidFill>
+                        </a:rPr>
+                        <a:t>新方案</a:t>
+                      </a:r>
+                    </a:p>
+                    <a:p>
+                      <a:pPr algn="ctr">
+                        <a:buNone/>
+                      </a:pPr>
+                      <a:r>
+                        <a:rPr lang="zh-CN" altLang="en-US" sz="2000" dirty="0">
+                          <a:solidFill>
+                            <a:srgbClr val="008000"/>
+                          </a:solidFill>
+                        </a:rPr>
+                        <a:t>正常模式 </a:t>
+                      </a:r>
+                      <a:r>
+                        <a:rPr lang="en-US" altLang="zh-CN" sz="2000" dirty="0">
+                          <a:solidFill>
+                            <a:schemeClr val="bg1">
+                              <a:lumMod val="50000"/>
+                            </a:schemeClr>
+                          </a:solidFill>
+                        </a:rPr>
+                        <a:t>/</a:t>
+                      </a:r>
+                      <a:r>
+                        <a:rPr lang="zh-CN" altLang="en-US" sz="2000" dirty="0">
+                          <a:solidFill>
+                            <a:schemeClr val="tx1"/>
+                          </a:solidFill>
+                        </a:rPr>
+                        <a:t> </a:t>
+                      </a:r>
+                      <a:r>
+                        <a:rPr lang="zh-CN" altLang="en-US" sz="2000" dirty="0">
+                          <a:solidFill>
+                            <a:srgbClr val="FF0000"/>
+                          </a:solidFill>
+                        </a:rPr>
+                        <a:t>故障模式</a:t>
+                      </a:r>
+                      <a:endParaRPr lang="" altLang="en-US" sz="2000" dirty="0">
+                        <a:solidFill>
+                          <a:schemeClr val="tx1"/>
+                        </a:solidFill>
+                      </a:endParaRPr>
+                    </a:p>
+                  </a:txBody>
+                  <a:tcPr anchor="ctr">
+                    <a:gradFill>
+                      <a:gsLst>
+                        <a:gs pos="0">
+                          <a:schemeClr val="accent1">
+                            <a:lumMod val="5000"/>
+                            <a:lumOff val="95000"/>
+                          </a:schemeClr>
+                        </a:gs>
+                        <a:gs pos="74000">
+                          <a:schemeClr val="accent1">
+                            <a:lumMod val="45000"/>
+                            <a:lumOff val="55000"/>
+                          </a:schemeClr>
+                        </a:gs>
+                        <a:gs pos="83000">
+                          <a:schemeClr val="accent1">
+                            <a:lumMod val="45000"/>
+                            <a:lumOff val="55000"/>
+                          </a:schemeClr>
+                        </a:gs>
+                        <a:gs pos="100000">
+                          <a:schemeClr val="accent1">
+                            <a:lumMod val="30000"/>
+                            <a:lumOff val="70000"/>
+                          </a:schemeClr>
+                        </a:gs>
+                      </a:gsLst>
+                      <a:lin ang="5400000" scaled="1"/>
+                    </a:gradFill>
+                  </a:tcPr>
+                </a:tc>
+                <a:tc hMerge="1">
+                  <a:txBody>
+                    <a:bodyPr/>
+                    <a:lstStyle/>
+                    <a:p>
+                      <a:endParaRPr lang="en-US" dirty="0"/>
+                    </a:p>
+                  </a:txBody>
+                  <a:tcPr anchor="ctr"/>
+                </a:tc>
+                <a:extLst>
+                  <a:ext uri="{0D108BD9-81ED-4DB2-BD59-A6C34878D82A}">
+                    <a16:rowId xmlns:a16="http://schemas.microsoft.com/office/drawing/2014/main" val="10000"/>
+                  </a:ext>
+                </a:extLst>
+              </a:tr>
+              <a:tr h="699135">
+                <a:tc>
+                  <a:txBody>
+                    <a:bodyPr/>
+                    <a:lstStyle/>
+                    <a:p>
+                      <a:pPr algn="ctr">
+                        <a:buNone/>
+                      </a:pPr>
+                      <a:r>
+                        <a:rPr lang="en-US" altLang="en-US" sz="2000" dirty="0">
+                          <a:solidFill>
+                            <a:srgbClr val="7030A0"/>
+                          </a:solidFill>
+                        </a:rPr>
+                        <a:t>62%</a:t>
+                      </a:r>
+                    </a:p>
+                  </a:txBody>
+                  <a:tcPr anchor="ctr">
+                    <a:gradFill>
+                      <a:gsLst>
+                        <a:gs pos="0">
+                          <a:schemeClr val="accent1">
+                            <a:lumMod val="5000"/>
+                            <a:lumOff val="95000"/>
+                          </a:schemeClr>
+                        </a:gs>
+                        <a:gs pos="74000">
+                          <a:schemeClr val="accent1">
+                            <a:lumMod val="45000"/>
+                            <a:lumOff val="55000"/>
+                          </a:schemeClr>
+                        </a:gs>
+                        <a:gs pos="83000">
+                          <a:schemeClr val="accent1">
+                            <a:lumMod val="45000"/>
+                            <a:lumOff val="55000"/>
+                          </a:schemeClr>
+                        </a:gs>
+                        <a:gs pos="100000">
+                          <a:schemeClr val="accent1">
+                            <a:lumMod val="30000"/>
+                            <a:lumOff val="70000"/>
+                          </a:schemeClr>
+                        </a:gs>
+                      </a:gsLst>
+                      <a:lin ang="5400000" scaled="1"/>
+                    </a:gradFill>
+                  </a:tcPr>
+                </a:tc>
+                <a:tc>
+                  <a:txBody>
+                    <a:bodyPr/>
+                    <a:lstStyle/>
+                    <a:p>
+                      <a:pPr algn="ctr">
+                        <a:buNone/>
+                      </a:pPr>
+                      <a:r>
+                        <a:rPr lang="en-US" altLang="zh-CN" sz="2000" dirty="0"/>
+                        <a:t>17535</a:t>
+                      </a:r>
+                      <a:r>
+                        <a:rPr lang="zh-CN" altLang="en-US" sz="2000" dirty="0"/>
+                        <a:t>，</a:t>
+                      </a:r>
+                      <a:r>
+                        <a:rPr lang="en-US" altLang="zh-CN" sz="2000" dirty="0"/>
+                        <a:t>401</a:t>
+                      </a:r>
+                      <a:endParaRPr lang="en-US" altLang="en-US" sz="2000" dirty="0"/>
+                    </a:p>
+                  </a:txBody>
+                  <a:tcPr anchor="ctr">
+                    <a:gradFill>
+                      <a:gsLst>
+                        <a:gs pos="0">
+                          <a:schemeClr val="accent1">
+                            <a:lumMod val="5000"/>
+                            <a:lumOff val="95000"/>
+                          </a:schemeClr>
+                        </a:gs>
+                        <a:gs pos="74000">
+                          <a:schemeClr val="accent1">
+                            <a:lumMod val="45000"/>
+                            <a:lumOff val="55000"/>
+                          </a:schemeClr>
+                        </a:gs>
+                        <a:gs pos="83000">
+                          <a:schemeClr val="accent1">
+                            <a:lumMod val="45000"/>
+                            <a:lumOff val="55000"/>
+                          </a:schemeClr>
+                        </a:gs>
+                        <a:gs pos="100000">
+                          <a:schemeClr val="accent1">
+                            <a:lumMod val="30000"/>
+                            <a:lumOff val="70000"/>
+                          </a:schemeClr>
+                        </a:gs>
+                      </a:gsLst>
+                      <a:lin ang="5400000" scaled="1"/>
+                    </a:gradFill>
+                  </a:tcPr>
+                </a:tc>
+                <a:tc>
+                  <a:txBody>
+                    <a:bodyPr/>
+                    <a:lstStyle/>
+                    <a:p>
+                      <a:pPr algn="ctr">
+                        <a:buNone/>
+                      </a:pPr>
+                      <a:r>
+                        <a:rPr lang="en-US" sz="2000" dirty="0">
+                          <a:solidFill>
+                            <a:srgbClr val="008000"/>
+                          </a:solidFill>
+                        </a:rPr>
+                        <a:t>19353</a:t>
+                      </a:r>
+                      <a:r>
+                        <a:rPr lang="en-US" altLang="en-US" sz="2000" dirty="0">
+                          <a:solidFill>
+                            <a:srgbClr val="008000"/>
+                          </a:solidFill>
+                        </a:rPr>
+                        <a:t>，</a:t>
+                      </a:r>
+                      <a:r>
+                        <a:rPr lang="en-US" sz="2000" dirty="0">
+                          <a:solidFill>
+                            <a:srgbClr val="008000"/>
+                          </a:solidFill>
+                        </a:rPr>
+                        <a:t>3</a:t>
+                      </a:r>
+                      <a:r>
+                        <a:rPr lang="en-US" altLang="en-US" sz="2000" dirty="0">
+                          <a:solidFill>
+                            <a:srgbClr val="008000"/>
+                          </a:solidFill>
+                        </a:rPr>
+                        <a:t>80</a:t>
+                      </a:r>
+                    </a:p>
+                  </a:txBody>
+                  <a:tcPr anchor="ctr">
+                    <a:gradFill>
+                      <a:gsLst>
+                        <a:gs pos="0">
+                          <a:schemeClr val="accent1">
+                            <a:lumMod val="5000"/>
+                            <a:lumOff val="95000"/>
+                          </a:schemeClr>
+                        </a:gs>
+                        <a:gs pos="74000">
+                          <a:schemeClr val="accent1">
+                            <a:lumMod val="45000"/>
+                            <a:lumOff val="55000"/>
+                          </a:schemeClr>
+                        </a:gs>
+                        <a:gs pos="83000">
+                          <a:schemeClr val="accent1">
+                            <a:lumMod val="45000"/>
+                            <a:lumOff val="55000"/>
+                          </a:schemeClr>
+                        </a:gs>
+                        <a:gs pos="100000">
+                          <a:schemeClr val="accent1">
+                            <a:lumMod val="30000"/>
+                            <a:lumOff val="70000"/>
+                          </a:schemeClr>
+                        </a:gs>
+                      </a:gsLst>
+                      <a:lin ang="5400000" scaled="1"/>
+                    </a:gradFill>
+                  </a:tcPr>
+                </a:tc>
+                <a:tc>
+                  <a:txBody>
+                    <a:bodyPr/>
+                    <a:lstStyle/>
+                    <a:p>
+                      <a:pPr algn="ctr">
+                        <a:buNone/>
+                      </a:pPr>
+                      <a:r>
+                        <a:rPr lang="en-US" sz="2000" dirty="0">
+                          <a:solidFill>
+                            <a:srgbClr val="FF0000"/>
+                          </a:solidFill>
+                        </a:rPr>
+                        <a:t>16643</a:t>
+                      </a:r>
+                      <a:r>
+                        <a:rPr lang="en-US" altLang="en-US" sz="2000" dirty="0">
+                          <a:solidFill>
+                            <a:srgbClr val="FF0000"/>
+                          </a:solidFill>
+                        </a:rPr>
+                        <a:t>，</a:t>
+                      </a:r>
+                      <a:r>
+                        <a:rPr lang="en-US" sz="2000" dirty="0">
+                          <a:solidFill>
+                            <a:srgbClr val="FF0000"/>
+                          </a:solidFill>
+                        </a:rPr>
+                        <a:t>291</a:t>
+                      </a:r>
+                    </a:p>
+                  </a:txBody>
+                  <a:tcPr anchor="ctr">
+                    <a:gradFill>
+                      <a:gsLst>
+                        <a:gs pos="0">
+                          <a:schemeClr val="accent1">
+                            <a:lumMod val="5000"/>
+                            <a:lumOff val="95000"/>
+                          </a:schemeClr>
+                        </a:gs>
+                        <a:gs pos="74000">
+                          <a:schemeClr val="accent1">
+                            <a:lumMod val="45000"/>
+                            <a:lumOff val="55000"/>
+                          </a:schemeClr>
+                        </a:gs>
+                        <a:gs pos="83000">
+                          <a:schemeClr val="accent1">
+                            <a:lumMod val="45000"/>
+                            <a:lumOff val="55000"/>
+                          </a:schemeClr>
+                        </a:gs>
+                        <a:gs pos="100000">
+                          <a:schemeClr val="accent1">
+                            <a:lumMod val="30000"/>
+                            <a:lumOff val="70000"/>
+                          </a:schemeClr>
+                        </a:gs>
+                      </a:gsLst>
+                      <a:lin ang="5400000" scaled="1"/>
+                    </a:gradFill>
+                  </a:tcPr>
+                </a:tc>
+                <a:extLst>
+                  <a:ext uri="{0D108BD9-81ED-4DB2-BD59-A6C34878D82A}">
+                    <a16:rowId xmlns:a16="http://schemas.microsoft.com/office/drawing/2014/main" val="10002"/>
+                  </a:ext>
+                </a:extLst>
+              </a:tr>
+              <a:tr h="699135">
+                <a:tc>
+                  <a:txBody>
+                    <a:bodyPr/>
+                    <a:lstStyle/>
+                    <a:p>
+                      <a:pPr algn="ctr">
+                        <a:buNone/>
+                      </a:pPr>
+                      <a:r>
+                        <a:rPr lang="en-US" altLang="en-US" sz="2000" dirty="0">
+                          <a:solidFill>
+                            <a:srgbClr val="7030A0"/>
+                          </a:solidFill>
+                        </a:rPr>
+                        <a:t>70%</a:t>
+                      </a:r>
+                    </a:p>
+                  </a:txBody>
+                  <a:tcPr anchor="ctr">
+                    <a:gradFill>
+                      <a:gsLst>
+                        <a:gs pos="0">
+                          <a:schemeClr val="accent1">
+                            <a:lumMod val="5000"/>
+                            <a:lumOff val="95000"/>
+                          </a:schemeClr>
+                        </a:gs>
+                        <a:gs pos="74000">
+                          <a:schemeClr val="accent1">
+                            <a:lumMod val="45000"/>
+                            <a:lumOff val="55000"/>
+                          </a:schemeClr>
+                        </a:gs>
+                        <a:gs pos="83000">
+                          <a:schemeClr val="accent1">
+                            <a:lumMod val="45000"/>
+                            <a:lumOff val="55000"/>
+                          </a:schemeClr>
+                        </a:gs>
+                        <a:gs pos="100000">
+                          <a:schemeClr val="accent1">
+                            <a:lumMod val="30000"/>
+                            <a:lumOff val="70000"/>
+                          </a:schemeClr>
+                        </a:gs>
+                      </a:gsLst>
+                      <a:lin ang="5400000" scaled="1"/>
+                    </a:gradFill>
+                  </a:tcPr>
+                </a:tc>
+                <a:tc>
+                  <a:txBody>
+                    <a:bodyPr/>
+                    <a:lstStyle/>
+                    <a:p>
+                      <a:pPr algn="ctr">
+                        <a:buNone/>
+                      </a:pPr>
+                      <a:r>
+                        <a:rPr lang="en-US" altLang="zh-CN" sz="2000" dirty="0"/>
+                        <a:t>19634</a:t>
+                      </a:r>
+                      <a:r>
+                        <a:rPr lang="zh-CN" altLang="en-US" sz="2000" dirty="0"/>
+                        <a:t>，</a:t>
+                      </a:r>
+                      <a:r>
+                        <a:rPr lang="en-US" altLang="zh-CN" sz="2000" dirty="0"/>
+                        <a:t>402</a:t>
+                      </a:r>
+                      <a:endParaRPr lang="en-US" altLang="en-US" sz="2000" dirty="0"/>
+                    </a:p>
+                  </a:txBody>
+                  <a:tcPr anchor="ctr">
+                    <a:gradFill>
+                      <a:gsLst>
+                        <a:gs pos="0">
+                          <a:schemeClr val="accent1">
+                            <a:lumMod val="5000"/>
+                            <a:lumOff val="95000"/>
+                          </a:schemeClr>
+                        </a:gs>
+                        <a:gs pos="74000">
+                          <a:schemeClr val="accent1">
+                            <a:lumMod val="45000"/>
+                            <a:lumOff val="55000"/>
+                          </a:schemeClr>
+                        </a:gs>
+                        <a:gs pos="83000">
+                          <a:schemeClr val="accent1">
+                            <a:lumMod val="45000"/>
+                            <a:lumOff val="55000"/>
+                          </a:schemeClr>
+                        </a:gs>
+                        <a:gs pos="100000">
+                          <a:schemeClr val="accent1">
+                            <a:lumMod val="30000"/>
+                            <a:lumOff val="70000"/>
+                          </a:schemeClr>
+                        </a:gs>
+                      </a:gsLst>
+                      <a:lin ang="5400000" scaled="1"/>
+                    </a:gradFill>
+                  </a:tcPr>
+                </a:tc>
+                <a:tc>
+                  <a:txBody>
+                    <a:bodyPr/>
+                    <a:lstStyle/>
+                    <a:p>
+                      <a:pPr algn="ctr">
+                        <a:buNone/>
+                      </a:pPr>
+                      <a:r>
+                        <a:rPr lang="en-US" sz="2000" dirty="0">
+                          <a:solidFill>
+                            <a:srgbClr val="008000"/>
+                          </a:solidFill>
+                        </a:rPr>
+                        <a:t>21988</a:t>
+                      </a:r>
+                      <a:r>
+                        <a:rPr lang="en-US" altLang="en-US" sz="2000" dirty="0">
+                          <a:solidFill>
+                            <a:srgbClr val="008000"/>
+                          </a:solidFill>
+                        </a:rPr>
+                        <a:t>，</a:t>
+                      </a:r>
+                      <a:r>
+                        <a:rPr lang="en-US" sz="2000" dirty="0">
+                          <a:solidFill>
+                            <a:srgbClr val="008000"/>
+                          </a:solidFill>
+                        </a:rPr>
+                        <a:t>407</a:t>
+                      </a:r>
+                    </a:p>
+                  </a:txBody>
+                  <a:tcPr anchor="ctr">
+                    <a:gradFill>
+                      <a:gsLst>
+                        <a:gs pos="0">
+                          <a:schemeClr val="accent1">
+                            <a:lumMod val="5000"/>
+                            <a:lumOff val="95000"/>
+                          </a:schemeClr>
+                        </a:gs>
+                        <a:gs pos="74000">
+                          <a:schemeClr val="accent1">
+                            <a:lumMod val="45000"/>
+                            <a:lumOff val="55000"/>
+                          </a:schemeClr>
+                        </a:gs>
+                        <a:gs pos="83000">
+                          <a:schemeClr val="accent1">
+                            <a:lumMod val="45000"/>
+                            <a:lumOff val="55000"/>
+                          </a:schemeClr>
+                        </a:gs>
+                        <a:gs pos="100000">
+                          <a:schemeClr val="accent1">
+                            <a:lumMod val="30000"/>
+                            <a:lumOff val="70000"/>
+                          </a:schemeClr>
+                        </a:gs>
+                      </a:gsLst>
+                      <a:lin ang="5400000" scaled="1"/>
+                    </a:gradFill>
+                  </a:tcPr>
+                </a:tc>
+                <a:tc>
+                  <a:txBody>
+                    <a:bodyPr/>
+                    <a:lstStyle/>
+                    <a:p>
+                      <a:pPr algn="ctr">
+                        <a:buNone/>
+                      </a:pPr>
+                      <a:r>
+                        <a:rPr lang="en-US" sz="2000" dirty="0">
+                          <a:solidFill>
+                            <a:srgbClr val="FF0000"/>
+                          </a:solidFill>
+                        </a:rPr>
+                        <a:t>17982</a:t>
+                      </a:r>
+                      <a:r>
+                        <a:rPr lang="en-US" altLang="en-US" sz="2000" dirty="0">
+                          <a:solidFill>
+                            <a:srgbClr val="FF0000"/>
+                          </a:solidFill>
+                        </a:rPr>
+                        <a:t>，</a:t>
+                      </a:r>
+                      <a:r>
+                        <a:rPr lang="en-US" sz="2000" dirty="0">
+                          <a:solidFill>
+                            <a:srgbClr val="FF0000"/>
+                          </a:solidFill>
+                        </a:rPr>
+                        <a:t>391</a:t>
+                      </a:r>
+                    </a:p>
+                  </a:txBody>
+                  <a:tcPr anchor="ctr">
+                    <a:gradFill>
+                      <a:gsLst>
+                        <a:gs pos="0">
+                          <a:schemeClr val="accent1">
+                            <a:lumMod val="5000"/>
+                            <a:lumOff val="95000"/>
+                          </a:schemeClr>
+                        </a:gs>
+                        <a:gs pos="74000">
+                          <a:schemeClr val="accent1">
+                            <a:lumMod val="45000"/>
+                            <a:lumOff val="55000"/>
+                          </a:schemeClr>
+                        </a:gs>
+                        <a:gs pos="83000">
+                          <a:schemeClr val="accent1">
+                            <a:lumMod val="45000"/>
+                            <a:lumOff val="55000"/>
+                          </a:schemeClr>
+                        </a:gs>
+                        <a:gs pos="100000">
+                          <a:schemeClr val="accent1">
+                            <a:lumMod val="30000"/>
+                            <a:lumOff val="70000"/>
+                          </a:schemeClr>
+                        </a:gs>
+                      </a:gsLst>
+                      <a:lin ang="5400000" scaled="1"/>
+                    </a:gradFill>
+                  </a:tcPr>
+                </a:tc>
+                <a:extLst>
+                  <a:ext uri="{0D108BD9-81ED-4DB2-BD59-A6C34878D82A}">
+                    <a16:rowId xmlns:a16="http://schemas.microsoft.com/office/drawing/2014/main" val="10003"/>
+                  </a:ext>
+                </a:extLst>
+              </a:tr>
+            </a:tbl>
+          </a:graphicData>
+        </a:graphic>
+      </p:graphicFrame>
+    </p:spTree>
+  </p:cSld>
+  <p:clrMapOvr>
+    <a:masterClrMapping/>
+  </p:clrMapOvr>
+</p:sld>
+</file>
+
+<file path=ppt/slides/slide7.xml><?xml version="1.0" encoding="utf-8"?>
+<p:sld xmlns:a="http://schemas.openxmlformats.org/drawingml/2006/main" xmlns:r="http://schemas.openxmlformats.org/officeDocument/2006/relationships" xmlns:p="http://schemas.openxmlformats.org/presentationml/2006/main">
+  <p:cSld>
+    <p:spTree>
+      <p:nvGrpSpPr>
+        <p:cNvPr id="1" name=""/>
+        <p:cNvGrpSpPr/>
+        <p:nvPr/>
+      </p:nvGrpSpPr>
+      <p:grpSpPr>
+        <a:xfrm>
+          <a:off x="0" y="0"/>
+          <a:ext cx="0" cy="0"/>
+          <a:chOff x="0" y="0"/>
+          <a:chExt cx="0" cy="0"/>
+        </a:xfrm>
+      </p:grpSpPr>
+      <p:sp>
+        <p:nvSpPr>
           <p:cNvPr id="2" name="标题 1"/>
           <p:cNvSpPr>
             <a:spLocks noGrp="1"/>
@@ -6470,7 +7733,7 @@
               <a:defRPr/>
             </a:pPr>
             <a:r>
-              <a:rPr smtClean="0">
+              <a:rPr>
                 <a:sym typeface="Arial" panose="02080604020202020204" pitchFamily="34" charset="0"/>
               </a:rPr>
               <a:t>观测间隔统计</a:t>
@@ -6501,12 +7764,12 @@
             </a:pPr>
             <a:fld id="{9FAFF1DE-EEE8-437C-A843-E0D864A24C4A}" type="slidenum">
               <a:rPr lang="en-US" altLang="zh-CN" smtClean="0"/>
+              <a:t>7</a:t>
             </a:fld>
             <a:r>
               <a:rPr lang="en-US" altLang="zh-CN"/>
               <a:t>/43</a:t>
             </a:r>
-            <a:endParaRPr lang="en-US" altLang="zh-CN"/>
           </a:p>
         </p:txBody>
       </p:sp>
@@ -6519,7 +7782,7 @@
           <p:nvPr/>
         </p:nvPicPr>
         <p:blipFill>
-          <a:blip r:embed="rId1">
+          <a:blip r:embed="rId2">
             <a:extLst>
               <a:ext uri="{28A0092B-C50C-407E-A947-70E740481C1C}">
                 <a14:useLocalDpi xmlns:a14="http://schemas.microsoft.com/office/drawing/2010/main" val="0"/>
@@ -6549,7 +7812,7 @@
           <p:nvPr/>
         </p:nvPicPr>
         <p:blipFill>
-          <a:blip r:embed="rId2">
+          <a:blip r:embed="rId3">
             <a:extLst>
               <a:ext uri="{28A0092B-C50C-407E-A947-70E740481C1C}">
                 <a14:useLocalDpi xmlns:a14="http://schemas.microsoft.com/office/drawing/2010/main" val="0"/>
@@ -6601,7 +7864,7 @@
               </a:spcBef>
             </a:pPr>
             <a:r>
-              <a:rPr lang="zh-CN" altLang="en-US" dirty="0" smtClean="0">
+              <a:rPr lang="zh-CN" altLang="en-US" dirty="0">
                 <a:solidFill>
                   <a:schemeClr val="tx1"/>
                 </a:solidFill>
@@ -6637,6 +7900,7 @@
           <a:bodyPr wrap="square" rtlCol="0">
             <a:spAutoFit/>
           </a:bodyPr>
+          <a:lstStyle/>
           <a:p>
             <a:pPr>
               <a:lnSpc>
@@ -6647,18 +7911,13 @@
               </a:spcBef>
             </a:pPr>
             <a:r>
-              <a:rPr lang="zh-CN" altLang="en-US" dirty="0" smtClean="0">
+              <a:rPr lang="zh-CN" altLang="en-US" dirty="0">
                 <a:solidFill>
                   <a:schemeClr val="tx1"/>
                 </a:solidFill>
               </a:rPr>
               <a:t>相邻两次观测时间间隔（不考虑滤光片是否相同）</a:t>
             </a:r>
-            <a:endParaRPr lang="zh-CN" altLang="en-US" dirty="0" smtClean="0">
-              <a:solidFill>
-                <a:schemeClr val="tx1"/>
-              </a:solidFill>
-            </a:endParaRPr>
           </a:p>
         </p:txBody>
       </p:sp>
@@ -6973,6 +8232,7 @@
       </a:lstStyle>
     </a:txDef>
   </a:objectDefaults>
+  <a:extraClrSchemeLst/>
   <a:extLst>
     <a:ext uri="{05A4C25C-085E-4340-85A3-A5531E510DB2}">
       <thm15:themeFamily xmlns:thm15="http://schemas.microsoft.com/office/thememl/2012/main" name="Office Theme" id="{62F939B6-93AF-4DB8-9C6B-D6C7DFDC589F}" vid="{4A3C46E8-61CC-4603-A589-7422A47A8E4A}"/>
@@ -7259,6 +8519,8 @@
       </a:bgFillStyleLst>
     </a:fmtScheme>
   </a:themeElements>
+  <a:objectDefaults/>
+  <a:extraClrSchemeLst/>
   <a:extLst>
     <a:ext uri="{05A4C25C-085E-4340-85A3-A5531E510DB2}">
       <thm15:themeFamily xmlns:thm15="http://schemas.microsoft.com/office/thememl/2012/main" name="Office Theme" id="{62F939B6-93AF-4DB8-9C6B-D6C7DFDC589F}" vid="{4A3C46E8-61CC-4603-A589-7422A47A8E4A}"/>
@@ -7545,6 +8807,8 @@
       </a:bgFillStyleLst>
     </a:fmtScheme>
   </a:themeElements>
+  <a:objectDefaults/>
+  <a:extraClrSchemeLst/>
   <a:extLst>
     <a:ext uri="{05A4C25C-085E-4340-85A3-A5531E510DB2}">
       <thm15:themeFamily xmlns:thm15="http://schemas.microsoft.com/office/thememl/2012/main" name="Office Theme" id="{62F939B6-93AF-4DB8-9C6B-D6C7DFDC589F}" vid="{4A3C46E8-61CC-4603-A589-7422A47A8E4A}"/>

</xml_diff>